<commit_message>
ESSEE E O PPT FINAL, DA UMA OLHADA
</commit_message>
<xml_diff>
--- a/MODELAGEM E SIMULACAO DO MUNDO FISICO PROJETO 2.pptx
+++ b/MODELAGEM E SIMULACAO DO MUNDO FISICO PROJETO 2.pptx
@@ -13,7 +13,7 @@
   <p:sldIdLst>
     <p:sldId id="256" r:id="rId3"/>
   </p:sldIdLst>
-  <p:sldSz cx="30275213" cy="21383625"/>
+  <p:sldSz cx="32435800" cy="27143075"/>
   <p:notesSz cx="6858000" cy="9144000"/>
   <p:defaultTextStyle>
     <a:defPPr>
@@ -390,8 +390,8 @@
         </p:nvSpPr>
         <p:spPr>
           <a:xfrm>
-            <a:off x="1244600" y="1143000"/>
-            <a:ext cx="4368800" cy="3086100"/>
+            <a:off x="1585913" y="1143000"/>
+            <a:ext cx="3686175" cy="3086100"/>
           </a:xfrm>
           <a:prstGeom prst="rect">
             <a:avLst/>
@@ -668,8 +668,8 @@
         </p:nvSpPr>
         <p:spPr>
           <a:xfrm>
-            <a:off x="1244600" y="1143000"/>
-            <a:ext cx="4368800" cy="3086100"/>
+            <a:off x="1585913" y="1143000"/>
+            <a:ext cx="3686175" cy="3086100"/>
           </a:xfrm>
         </p:spPr>
       </p:sp>
@@ -753,8 +753,8 @@
         </p:nvSpPr>
         <p:spPr>
           <a:xfrm>
-            <a:off x="30559045" y="-1"/>
-            <a:ext cx="9038860" cy="21383625"/>
+            <a:off x="32739888" y="3"/>
+            <a:ext cx="9683917" cy="27143075"/>
           </a:xfrm>
           <a:prstGeom prst="rect">
             <a:avLst/>
@@ -785,17 +785,17 @@
           </a:fontRef>
         </p:style>
         <p:txBody>
-          <a:bodyPr lIns="178198" rIns="178198" rtlCol="0" anchor="t"/>
+          <a:bodyPr lIns="167114" rIns="167114" rtlCol="0" anchor="t"/>
           <a:lstStyle/>
           <a:p>
             <a:pPr>
               <a:spcBef>
-                <a:spcPts val="780"/>
+                <a:spcPts val="731"/>
               </a:spcBef>
               <a:buSzPct val="100000"/>
             </a:pPr>
             <a:r>
-              <a:rPr lang="pt-BR" sz="6236" noProof="0" dirty="0">
+              <a:rPr lang="pt-BR" sz="5849" noProof="0" dirty="0">
                 <a:solidFill>
                   <a:srgbClr val="7F7F7F"/>
                 </a:solidFill>
@@ -810,12 +810,12 @@
           <a:p>
             <a:pPr>
               <a:spcBef>
-                <a:spcPts val="780"/>
+                <a:spcPts val="731"/>
               </a:spcBef>
               <a:buSzPct val="100000"/>
             </a:pPr>
             <a:r>
-              <a:rPr lang="pt-BR" sz="4288" noProof="0" dirty="0">
+              <a:rPr lang="pt-BR" sz="4021" noProof="0" dirty="0">
                 <a:solidFill>
                   <a:srgbClr val="7F7F7F"/>
                 </a:solidFill>
@@ -830,11 +830,11 @@
           <a:p>
             <a:pPr>
               <a:spcBef>
-                <a:spcPts val="195"/>
+                <a:spcPts val="183"/>
               </a:spcBef>
               <a:buSzPct val="100000"/>
             </a:pPr>
-            <a:endParaRPr lang="pt-BR" sz="4288" noProof="0" dirty="0">
+            <a:endParaRPr lang="pt-BR" sz="4021" noProof="0" dirty="0">
               <a:solidFill>
                 <a:srgbClr val="7F7F7F"/>
               </a:solidFill>
@@ -847,12 +847,12 @@
           <a:p>
             <a:pPr>
               <a:spcBef>
-                <a:spcPts val="780"/>
+                <a:spcPts val="731"/>
               </a:spcBef>
               <a:buSzPct val="100000"/>
             </a:pPr>
             <a:r>
-              <a:rPr lang="pt-BR" sz="5716" noProof="0" dirty="0">
+              <a:rPr lang="pt-BR" sz="5361" noProof="0" dirty="0">
                 <a:solidFill>
                   <a:srgbClr val="7F7F7F"/>
                 </a:solidFill>
@@ -867,12 +867,12 @@
           <a:p>
             <a:pPr>
               <a:spcBef>
-                <a:spcPts val="780"/>
+                <a:spcPts val="731"/>
               </a:spcBef>
               <a:buSzPct val="100000"/>
             </a:pPr>
             <a:r>
-              <a:rPr lang="pt-BR" sz="4288" noProof="0" dirty="0">
+              <a:rPr lang="pt-BR" sz="4021" noProof="0" dirty="0">
                 <a:solidFill>
                   <a:srgbClr val="7F7F7F"/>
                 </a:solidFill>
@@ -884,7 +884,7 @@
               <a:t>Os espaços reservados deste pôster estão formatados para você. Digite nos espaços reservados para adicionar texto ou clique em um ícone para adicionar uma tabela, gráfico, elemento gráfico </a:t>
             </a:r>
             <a:r>
-              <a:rPr lang="pt-BR" sz="4288" noProof="0" dirty="0" err="1">
+              <a:rPr lang="pt-BR" sz="4021" noProof="0" dirty="0" err="1">
                 <a:solidFill>
                   <a:srgbClr val="7F7F7F"/>
                 </a:solidFill>
@@ -896,7 +896,7 @@
               <a:t>SmartArt</a:t>
             </a:r>
             <a:r>
-              <a:rPr lang="pt-BR" sz="4288" noProof="0" dirty="0">
+              <a:rPr lang="pt-BR" sz="4021" noProof="0" dirty="0">
                 <a:solidFill>
                   <a:srgbClr val="7F7F7F"/>
                 </a:solidFill>
@@ -911,12 +911,12 @@
           <a:p>
             <a:pPr>
               <a:spcBef>
-                <a:spcPts val="1558"/>
+                <a:spcPts val="1461"/>
               </a:spcBef>
               <a:buSzPct val="100000"/>
             </a:pPr>
             <a:r>
-              <a:rPr lang="pt-BR" sz="4288" noProof="0" dirty="0">
+              <a:rPr lang="pt-BR" sz="4021" noProof="0" dirty="0">
                 <a:solidFill>
                   <a:srgbClr val="7F7F7F"/>
                 </a:solidFill>
@@ -931,12 +931,12 @@
           <a:p>
             <a:pPr>
               <a:spcBef>
-                <a:spcPts val="1558"/>
+                <a:spcPts val="1461"/>
               </a:spcBef>
               <a:buSzPct val="100000"/>
             </a:pPr>
             <a:r>
-              <a:rPr lang="pt-BR" sz="4288" noProof="0" dirty="0">
+              <a:rPr lang="pt-BR" sz="4021" noProof="0" dirty="0">
                 <a:solidFill>
                   <a:srgbClr val="7F7F7F"/>
                 </a:solidFill>
@@ -951,12 +951,12 @@
           <a:p>
             <a:pPr>
               <a:spcBef>
-                <a:spcPts val="1558"/>
+                <a:spcPts val="1461"/>
               </a:spcBef>
               <a:buSzPct val="100000"/>
             </a:pPr>
             <a:r>
-              <a:rPr lang="pt-BR" sz="4288" noProof="0" dirty="0">
+              <a:rPr lang="pt-BR" sz="4021" noProof="0" dirty="0">
                 <a:solidFill>
                   <a:srgbClr val="7F7F7F"/>
                 </a:solidFill>
@@ -1005,8 +1005,8 @@
         </p:nvSpPr>
         <p:spPr bwMode="auto">
           <a:xfrm>
-            <a:off x="798931" y="2659380"/>
-            <a:ext cx="20813665" cy="419853"/>
+            <a:off x="855955" y="3375660"/>
+            <a:ext cx="22299030" cy="532936"/>
           </a:xfrm>
         </p:spPr>
         <p:txBody>
@@ -1019,7 +1019,7 @@
                 <a:spcPts val="0"/>
               </a:spcBef>
               <a:buNone/>
-              <a:defRPr sz="2339">
+              <a:defRPr sz="2194">
                 <a:solidFill>
                   <a:schemeClr val="bg1">
                     <a:lumMod val="75000"/>
@@ -1032,7 +1032,7 @@
                 <a:spcPts val="0"/>
               </a:spcBef>
               <a:buNone/>
-              <a:defRPr sz="1558">
+              <a:defRPr sz="1461">
                 <a:solidFill>
                   <a:schemeClr val="bg1"/>
                 </a:solidFill>
@@ -1043,7 +1043,7 @@
                 <a:spcPts val="0"/>
               </a:spcBef>
               <a:buNone/>
-              <a:defRPr sz="1558">
+              <a:defRPr sz="1461">
                 <a:solidFill>
                   <a:schemeClr val="bg1"/>
                 </a:solidFill>
@@ -1054,7 +1054,7 @@
                 <a:spcPts val="0"/>
               </a:spcBef>
               <a:buNone/>
-              <a:defRPr sz="1558">
+              <a:defRPr sz="1461">
                 <a:solidFill>
                   <a:schemeClr val="bg1"/>
                 </a:solidFill>
@@ -1065,7 +1065,7 @@
                 <a:spcPts val="0"/>
               </a:spcBef>
               <a:buNone/>
-              <a:defRPr sz="1558">
+              <a:defRPr sz="1461">
                 <a:solidFill>
                   <a:schemeClr val="bg1"/>
                 </a:solidFill>
@@ -1076,7 +1076,7 @@
                 <a:spcPts val="0"/>
               </a:spcBef>
               <a:buNone/>
-              <a:defRPr sz="1558">
+              <a:defRPr sz="1461">
                 <a:solidFill>
                   <a:schemeClr val="bg1"/>
                 </a:solidFill>
@@ -1087,7 +1087,7 @@
                 <a:spcPts val="0"/>
               </a:spcBef>
               <a:buNone/>
-              <a:defRPr sz="1558">
+              <a:defRPr sz="1461">
                 <a:solidFill>
                   <a:schemeClr val="bg1"/>
                 </a:solidFill>
@@ -1098,7 +1098,7 @@
                 <a:spcPts val="0"/>
               </a:spcBef>
               <a:buNone/>
-              <a:defRPr sz="1558">
+              <a:defRPr sz="1461">
                 <a:solidFill>
                   <a:schemeClr val="bg1"/>
                 </a:solidFill>
@@ -1109,7 +1109,7 @@
                 <a:spcPts val="0"/>
               </a:spcBef>
               <a:buNone/>
-              <a:defRPr sz="1558">
+              <a:defRPr sz="1461">
                 <a:solidFill>
                   <a:schemeClr val="bg1"/>
                 </a:solidFill>
@@ -1137,8 +1137,8 @@
         </p:nvSpPr>
         <p:spPr>
           <a:xfrm>
-            <a:off x="788418" y="3682738"/>
-            <a:ext cx="8830270" cy="831584"/>
+            <a:off x="844683" y="4674645"/>
+            <a:ext cx="9460441" cy="1055562"/>
           </a:xfrm>
           <a:prstGeom prst="rect">
             <a:avLst/>
@@ -1177,7 +1177,7 @@
                 <a:spcPts val="0"/>
               </a:spcBef>
               <a:buNone/>
-              <a:defRPr sz="3508" cap="none" baseline="0">
+              <a:defRPr sz="3291" cap="none" baseline="0">
                 <a:solidFill>
                   <a:schemeClr val="bg1"/>
                 </a:solidFill>
@@ -1189,7 +1189,7 @@
                 <a:spcPts val="0"/>
               </a:spcBef>
               <a:buNone/>
-              <a:defRPr sz="3898" cap="all" baseline="0">
+              <a:defRPr sz="3656" cap="all" baseline="0">
                 <a:solidFill>
                   <a:schemeClr val="bg1"/>
                 </a:solidFill>
@@ -1201,7 +1201,7 @@
                 <a:spcPts val="0"/>
               </a:spcBef>
               <a:buNone/>
-              <a:defRPr sz="3898" cap="all" baseline="0">
+              <a:defRPr sz="3656" cap="all" baseline="0">
                 <a:solidFill>
                   <a:schemeClr val="bg1"/>
                 </a:solidFill>
@@ -1213,7 +1213,7 @@
                 <a:spcPts val="0"/>
               </a:spcBef>
               <a:buNone/>
-              <a:defRPr sz="3898" cap="all" baseline="0">
+              <a:defRPr sz="3656" cap="all" baseline="0">
                 <a:solidFill>
                   <a:schemeClr val="bg1"/>
                 </a:solidFill>
@@ -1225,7 +1225,7 @@
                 <a:spcPts val="0"/>
               </a:spcBef>
               <a:buNone/>
-              <a:defRPr sz="3898" cap="all" baseline="0">
+              <a:defRPr sz="3656" cap="all" baseline="0">
                 <a:solidFill>
                   <a:schemeClr val="bg1"/>
                 </a:solidFill>
@@ -1237,7 +1237,7 @@
                 <a:spcPts val="0"/>
               </a:spcBef>
               <a:buNone/>
-              <a:defRPr sz="3898" cap="all" baseline="0">
+              <a:defRPr sz="3656" cap="all" baseline="0">
                 <a:solidFill>
                   <a:schemeClr val="bg1"/>
                 </a:solidFill>
@@ -1249,7 +1249,7 @@
                 <a:spcPts val="0"/>
               </a:spcBef>
               <a:buNone/>
-              <a:defRPr sz="3898" cap="all" baseline="0">
+              <a:defRPr sz="3656" cap="all" baseline="0">
                 <a:solidFill>
                   <a:schemeClr val="bg1"/>
                 </a:solidFill>
@@ -1261,7 +1261,7 @@
                 <a:spcPts val="0"/>
               </a:spcBef>
               <a:buNone/>
-              <a:defRPr sz="3898" cap="all" baseline="0">
+              <a:defRPr sz="3656" cap="all" baseline="0">
                 <a:solidFill>
                   <a:schemeClr val="bg1"/>
                 </a:solidFill>
@@ -1273,7 +1273,7 @@
                 <a:spcPts val="0"/>
               </a:spcBef>
               <a:buNone/>
-              <a:defRPr sz="3898" cap="all" baseline="0">
+              <a:defRPr sz="3656" cap="all" baseline="0">
                 <a:solidFill>
                   <a:schemeClr val="bg1"/>
                 </a:solidFill>
@@ -1302,8 +1302,8 @@
         </p:nvSpPr>
         <p:spPr bwMode="ltGray">
           <a:xfrm>
-            <a:off x="788418" y="4621239"/>
-            <a:ext cx="8830270" cy="1775066"/>
+            <a:off x="844683" y="5865922"/>
+            <a:ext cx="9460441" cy="2253161"/>
           </a:xfrm>
           <a:solidFill>
             <a:schemeClr val="tx2">
@@ -1319,69 +1319,69 @@
           <a:lstStyle>
             <a:lvl1pPr marL="0" indent="0">
               <a:spcBef>
-                <a:spcPts val="780"/>
+                <a:spcPts val="731"/>
               </a:spcBef>
               <a:buFont typeface="Arial" panose="020B0604020202020204" pitchFamily="34" charset="0"/>
               <a:buNone/>
-              <a:defRPr sz="2859" baseline="0"/>
+              <a:defRPr sz="2681" baseline="0"/>
             </a:lvl1pPr>
-            <a:lvl2pPr marL="371257" indent="-371257">
-              <a:spcBef>
-                <a:spcPts val="780"/>
+            <a:lvl2pPr marL="348207" indent="-348207">
+              <a:spcBef>
+                <a:spcPts val="731"/>
               </a:spcBef>
               <a:buFont typeface="Arial" panose="020B0604020202020204" pitchFamily="34" charset="0"/>
               <a:buChar char="•"/>
-              <a:defRPr sz="2859"/>
+              <a:defRPr sz="2681"/>
             </a:lvl2pPr>
-            <a:lvl3pPr marL="371257" indent="-371257">
-              <a:spcBef>
-                <a:spcPts val="780"/>
+            <a:lvl3pPr marL="348207" indent="-348207">
+              <a:spcBef>
+                <a:spcPts val="731"/>
               </a:spcBef>
               <a:buFont typeface="Arial" panose="020B0604020202020204" pitchFamily="34" charset="0"/>
               <a:buChar char="•"/>
-              <a:defRPr sz="2859"/>
+              <a:defRPr sz="2681"/>
             </a:lvl3pPr>
             <a:lvl4pPr marL="0" indent="0">
               <a:spcBef>
-                <a:spcPts val="780"/>
-              </a:spcBef>
-              <a:buNone/>
-              <a:defRPr sz="2859"/>
+                <a:spcPts val="731"/>
+              </a:spcBef>
+              <a:buNone/>
+              <a:defRPr sz="2681"/>
             </a:lvl4pPr>
             <a:lvl5pPr marL="0" indent="0">
               <a:spcBef>
-                <a:spcPts val="780"/>
-              </a:spcBef>
-              <a:buNone/>
-              <a:defRPr sz="2859"/>
+                <a:spcPts val="731"/>
+              </a:spcBef>
+              <a:buNone/>
+              <a:defRPr sz="2681"/>
             </a:lvl5pPr>
             <a:lvl6pPr marL="0" indent="0">
               <a:spcBef>
-                <a:spcPts val="780"/>
-              </a:spcBef>
-              <a:buNone/>
-              <a:defRPr sz="2859"/>
+                <a:spcPts val="731"/>
+              </a:spcBef>
+              <a:buNone/>
+              <a:defRPr sz="2681"/>
             </a:lvl6pPr>
             <a:lvl7pPr marL="0" indent="0">
               <a:spcBef>
-                <a:spcPts val="780"/>
-              </a:spcBef>
-              <a:buNone/>
-              <a:defRPr sz="2859"/>
+                <a:spcPts val="731"/>
+              </a:spcBef>
+              <a:buNone/>
+              <a:defRPr sz="2681"/>
             </a:lvl7pPr>
             <a:lvl8pPr marL="0" indent="0">
               <a:spcBef>
-                <a:spcPts val="780"/>
-              </a:spcBef>
-              <a:buNone/>
-              <a:defRPr sz="2859"/>
+                <a:spcPts val="731"/>
+              </a:spcBef>
+              <a:buNone/>
+              <a:defRPr sz="2681"/>
             </a:lvl8pPr>
             <a:lvl9pPr marL="0" indent="0">
               <a:spcBef>
-                <a:spcPts val="780"/>
-              </a:spcBef>
-              <a:buNone/>
-              <a:defRPr sz="2859"/>
+                <a:spcPts val="731"/>
+              </a:spcBef>
+              <a:buNone/>
+              <a:defRPr sz="2681"/>
             </a:lvl9pPr>
           </a:lstStyle>
           <a:p>
@@ -1405,8 +1405,8 @@
         </p:nvSpPr>
         <p:spPr>
           <a:xfrm>
-            <a:off x="788418" y="6819002"/>
-            <a:ext cx="8830270" cy="831584"/>
+            <a:off x="844683" y="8655628"/>
+            <a:ext cx="9460441" cy="1055562"/>
           </a:xfrm>
           <a:prstGeom prst="rect">
             <a:avLst/>
@@ -1445,7 +1445,7 @@
                 <a:spcPts val="0"/>
               </a:spcBef>
               <a:buNone/>
-              <a:defRPr sz="3508" cap="none" baseline="0">
+              <a:defRPr sz="3291" cap="none" baseline="0">
                 <a:solidFill>
                   <a:schemeClr val="bg1"/>
                 </a:solidFill>
@@ -1457,7 +1457,7 @@
                 <a:spcPts val="0"/>
               </a:spcBef>
               <a:buNone/>
-              <a:defRPr sz="3898" cap="all" baseline="0">
+              <a:defRPr sz="3656" cap="all" baseline="0">
                 <a:solidFill>
                   <a:schemeClr val="bg1"/>
                 </a:solidFill>
@@ -1469,7 +1469,7 @@
                 <a:spcPts val="0"/>
               </a:spcBef>
               <a:buNone/>
-              <a:defRPr sz="3898" cap="all" baseline="0">
+              <a:defRPr sz="3656" cap="all" baseline="0">
                 <a:solidFill>
                   <a:schemeClr val="bg1"/>
                 </a:solidFill>
@@ -1481,7 +1481,7 @@
                 <a:spcPts val="0"/>
               </a:spcBef>
               <a:buNone/>
-              <a:defRPr sz="3898" cap="all" baseline="0">
+              <a:defRPr sz="3656" cap="all" baseline="0">
                 <a:solidFill>
                   <a:schemeClr val="bg1"/>
                 </a:solidFill>
@@ -1493,7 +1493,7 @@
                 <a:spcPts val="0"/>
               </a:spcBef>
               <a:buNone/>
-              <a:defRPr sz="3898" cap="all" baseline="0">
+              <a:defRPr sz="3656" cap="all" baseline="0">
                 <a:solidFill>
                   <a:schemeClr val="bg1"/>
                 </a:solidFill>
@@ -1505,7 +1505,7 @@
                 <a:spcPts val="0"/>
               </a:spcBef>
               <a:buNone/>
-              <a:defRPr sz="3898" cap="all" baseline="0">
+              <a:defRPr sz="3656" cap="all" baseline="0">
                 <a:solidFill>
                   <a:schemeClr val="bg1"/>
                 </a:solidFill>
@@ -1517,7 +1517,7 @@
                 <a:spcPts val="0"/>
               </a:spcBef>
               <a:buNone/>
-              <a:defRPr sz="3898" cap="all" baseline="0">
+              <a:defRPr sz="3656" cap="all" baseline="0">
                 <a:solidFill>
                   <a:schemeClr val="bg1"/>
                 </a:solidFill>
@@ -1529,7 +1529,7 @@
                 <a:spcPts val="0"/>
               </a:spcBef>
               <a:buNone/>
-              <a:defRPr sz="3898" cap="all" baseline="0">
+              <a:defRPr sz="3656" cap="all" baseline="0">
                 <a:solidFill>
                   <a:schemeClr val="bg1"/>
                 </a:solidFill>
@@ -1541,7 +1541,7 @@
                 <a:spcPts val="0"/>
               </a:spcBef>
               <a:buNone/>
-              <a:defRPr sz="3898" cap="all" baseline="0">
+              <a:defRPr sz="3656" cap="all" baseline="0">
                 <a:solidFill>
                   <a:schemeClr val="bg1"/>
                 </a:solidFill>
@@ -1570,39 +1570,39 @@
         </p:nvSpPr>
         <p:spPr>
           <a:xfrm>
-            <a:off x="788418" y="7709986"/>
-            <a:ext cx="8830270" cy="1823742"/>
+            <a:off x="844683" y="9786588"/>
+            <a:ext cx="9460441" cy="2314947"/>
           </a:xfrm>
         </p:spPr>
         <p:txBody>
           <a:bodyPr lIns="91440" tIns="182880"/>
           <a:lstStyle>
             <a:lvl1pPr>
-              <a:defRPr sz="2079" baseline="0"/>
+              <a:defRPr sz="1950" baseline="0"/>
             </a:lvl1pPr>
             <a:lvl2pPr>
-              <a:defRPr sz="1819"/>
+              <a:defRPr sz="1706"/>
             </a:lvl2pPr>
             <a:lvl3pPr>
-              <a:defRPr sz="1819"/>
+              <a:defRPr sz="1706"/>
             </a:lvl3pPr>
             <a:lvl4pPr>
-              <a:defRPr sz="1819"/>
+              <a:defRPr sz="1706"/>
             </a:lvl4pPr>
             <a:lvl5pPr>
-              <a:defRPr sz="1819"/>
+              <a:defRPr sz="1706"/>
             </a:lvl5pPr>
             <a:lvl6pPr>
-              <a:defRPr sz="1819"/>
+              <a:defRPr sz="1706"/>
             </a:lvl6pPr>
             <a:lvl7pPr>
-              <a:defRPr sz="1819"/>
+              <a:defRPr sz="1706"/>
             </a:lvl7pPr>
             <a:lvl8pPr>
-              <a:defRPr sz="1819"/>
+              <a:defRPr sz="1706"/>
             </a:lvl8pPr>
             <a:lvl9pPr>
-              <a:defRPr sz="1819"/>
+              <a:defRPr sz="1706"/>
             </a:lvl9pPr>
           </a:lstStyle>
           <a:p>
@@ -1647,8 +1647,8 @@
         </p:nvSpPr>
         <p:spPr>
           <a:xfrm>
-            <a:off x="788418" y="9711730"/>
-            <a:ext cx="8830270" cy="791986"/>
+            <a:off x="844683" y="12327480"/>
+            <a:ext cx="9460441" cy="1005299"/>
           </a:xfrm>
           <a:prstGeom prst="rect">
             <a:avLst/>
@@ -1687,7 +1687,7 @@
                 <a:spcPts val="0"/>
               </a:spcBef>
               <a:buNone/>
-              <a:defRPr sz="3508" cap="none" baseline="0">
+              <a:defRPr sz="3291" cap="none" baseline="0">
                 <a:solidFill>
                   <a:schemeClr val="bg1"/>
                 </a:solidFill>
@@ -1699,7 +1699,7 @@
                 <a:spcPts val="0"/>
               </a:spcBef>
               <a:buNone/>
-              <a:defRPr sz="3898" cap="all" baseline="0">
+              <a:defRPr sz="3656" cap="all" baseline="0">
                 <a:solidFill>
                   <a:schemeClr val="bg1"/>
                 </a:solidFill>
@@ -1711,7 +1711,7 @@
                 <a:spcPts val="0"/>
               </a:spcBef>
               <a:buNone/>
-              <a:defRPr sz="3898" cap="all" baseline="0">
+              <a:defRPr sz="3656" cap="all" baseline="0">
                 <a:solidFill>
                   <a:schemeClr val="bg1"/>
                 </a:solidFill>
@@ -1723,7 +1723,7 @@
                 <a:spcPts val="0"/>
               </a:spcBef>
               <a:buNone/>
-              <a:defRPr sz="3898" cap="all" baseline="0">
+              <a:defRPr sz="3656" cap="all" baseline="0">
                 <a:solidFill>
                   <a:schemeClr val="bg1"/>
                 </a:solidFill>
@@ -1735,7 +1735,7 @@
                 <a:spcPts val="0"/>
               </a:spcBef>
               <a:buNone/>
-              <a:defRPr sz="3898" cap="all" baseline="0">
+              <a:defRPr sz="3656" cap="all" baseline="0">
                 <a:solidFill>
                   <a:schemeClr val="bg1"/>
                 </a:solidFill>
@@ -1747,7 +1747,7 @@
                 <a:spcPts val="0"/>
               </a:spcBef>
               <a:buNone/>
-              <a:defRPr sz="3898" cap="all" baseline="0">
+              <a:defRPr sz="3656" cap="all" baseline="0">
                 <a:solidFill>
                   <a:schemeClr val="bg1"/>
                 </a:solidFill>
@@ -1759,7 +1759,7 @@
                 <a:spcPts val="0"/>
               </a:spcBef>
               <a:buNone/>
-              <a:defRPr sz="3898" cap="all" baseline="0">
+              <a:defRPr sz="3656" cap="all" baseline="0">
                 <a:solidFill>
                   <a:schemeClr val="bg1"/>
                 </a:solidFill>
@@ -1771,7 +1771,7 @@
                 <a:spcPts val="0"/>
               </a:spcBef>
               <a:buNone/>
-              <a:defRPr sz="3898" cap="all" baseline="0">
+              <a:defRPr sz="3656" cap="all" baseline="0">
                 <a:solidFill>
                   <a:schemeClr val="bg1"/>
                 </a:solidFill>
@@ -1783,7 +1783,7 @@
                 <a:spcPts val="0"/>
               </a:spcBef>
               <a:buNone/>
-              <a:defRPr sz="3898" cap="all" baseline="0">
+              <a:defRPr sz="3656" cap="all" baseline="0">
                 <a:solidFill>
                   <a:schemeClr val="bg1"/>
                 </a:solidFill>
@@ -1812,39 +1812,39 @@
         </p:nvSpPr>
         <p:spPr>
           <a:xfrm>
-            <a:off x="788418" y="10679934"/>
-            <a:ext cx="8830270" cy="3915408"/>
+            <a:off x="844683" y="13556460"/>
+            <a:ext cx="9460441" cy="4969981"/>
           </a:xfrm>
         </p:spPr>
         <p:txBody>
           <a:bodyPr lIns="91440" tIns="182880"/>
           <a:lstStyle>
             <a:lvl1pPr>
-              <a:defRPr sz="2079" baseline="0"/>
+              <a:defRPr sz="1950" baseline="0"/>
             </a:lvl1pPr>
             <a:lvl2pPr>
-              <a:defRPr sz="1819"/>
+              <a:defRPr sz="1706"/>
             </a:lvl2pPr>
             <a:lvl3pPr>
-              <a:defRPr sz="1819"/>
+              <a:defRPr sz="1706"/>
             </a:lvl3pPr>
             <a:lvl4pPr>
-              <a:defRPr sz="1819"/>
+              <a:defRPr sz="1706"/>
             </a:lvl4pPr>
             <a:lvl5pPr>
-              <a:defRPr sz="1819"/>
+              <a:defRPr sz="1706"/>
             </a:lvl5pPr>
             <a:lvl6pPr>
-              <a:defRPr sz="1819"/>
+              <a:defRPr sz="1706"/>
             </a:lvl6pPr>
             <a:lvl7pPr>
-              <a:defRPr sz="1819"/>
+              <a:defRPr sz="1706"/>
             </a:lvl7pPr>
             <a:lvl8pPr>
-              <a:defRPr sz="1819"/>
+              <a:defRPr sz="1706"/>
             </a:lvl8pPr>
             <a:lvl9pPr>
-              <a:defRPr sz="1819"/>
+              <a:defRPr sz="1706"/>
             </a:lvl9pPr>
           </a:lstStyle>
           <a:p>
@@ -1924,8 +1924,8 @@
         </p:nvSpPr>
         <p:spPr>
           <a:xfrm>
-            <a:off x="788418" y="14867559"/>
-            <a:ext cx="8830270" cy="791986"/>
+            <a:off x="844683" y="18871977"/>
+            <a:ext cx="9460441" cy="1005299"/>
           </a:xfrm>
           <a:prstGeom prst="rect">
             <a:avLst/>
@@ -1964,7 +1964,7 @@
                 <a:spcPts val="0"/>
               </a:spcBef>
               <a:buNone/>
-              <a:defRPr sz="3508" cap="none" baseline="0">
+              <a:defRPr sz="3291" cap="none" baseline="0">
                 <a:solidFill>
                   <a:schemeClr val="bg1"/>
                 </a:solidFill>
@@ -1976,7 +1976,7 @@
                 <a:spcPts val="0"/>
               </a:spcBef>
               <a:buNone/>
-              <a:defRPr sz="3898" cap="all" baseline="0">
+              <a:defRPr sz="3656" cap="all" baseline="0">
                 <a:solidFill>
                   <a:schemeClr val="bg1"/>
                 </a:solidFill>
@@ -1988,7 +1988,7 @@
                 <a:spcPts val="0"/>
               </a:spcBef>
               <a:buNone/>
-              <a:defRPr sz="3898" cap="all" baseline="0">
+              <a:defRPr sz="3656" cap="all" baseline="0">
                 <a:solidFill>
                   <a:schemeClr val="bg1"/>
                 </a:solidFill>
@@ -2000,7 +2000,7 @@
                 <a:spcPts val="0"/>
               </a:spcBef>
               <a:buNone/>
-              <a:defRPr sz="3898" cap="all" baseline="0">
+              <a:defRPr sz="3656" cap="all" baseline="0">
                 <a:solidFill>
                   <a:schemeClr val="bg1"/>
                 </a:solidFill>
@@ -2012,7 +2012,7 @@
                 <a:spcPts val="0"/>
               </a:spcBef>
               <a:buNone/>
-              <a:defRPr sz="3898" cap="all" baseline="0">
+              <a:defRPr sz="3656" cap="all" baseline="0">
                 <a:solidFill>
                   <a:schemeClr val="bg1"/>
                 </a:solidFill>
@@ -2024,7 +2024,7 @@
                 <a:spcPts val="0"/>
               </a:spcBef>
               <a:buNone/>
-              <a:defRPr sz="3898" cap="all" baseline="0">
+              <a:defRPr sz="3656" cap="all" baseline="0">
                 <a:solidFill>
                   <a:schemeClr val="bg1"/>
                 </a:solidFill>
@@ -2036,7 +2036,7 @@
                 <a:spcPts val="0"/>
               </a:spcBef>
               <a:buNone/>
-              <a:defRPr sz="3898" cap="all" baseline="0">
+              <a:defRPr sz="3656" cap="all" baseline="0">
                 <a:solidFill>
                   <a:schemeClr val="bg1"/>
                 </a:solidFill>
@@ -2048,7 +2048,7 @@
                 <a:spcPts val="0"/>
               </a:spcBef>
               <a:buNone/>
-              <a:defRPr sz="3898" cap="all" baseline="0">
+              <a:defRPr sz="3656" cap="all" baseline="0">
                 <a:solidFill>
                   <a:schemeClr val="bg1"/>
                 </a:solidFill>
@@ -2060,7 +2060,7 @@
                 <a:spcPts val="0"/>
               </a:spcBef>
               <a:buNone/>
-              <a:defRPr sz="3898" cap="all" baseline="0">
+              <a:defRPr sz="3656" cap="all" baseline="0">
                 <a:solidFill>
                   <a:schemeClr val="bg1"/>
                 </a:solidFill>
@@ -2089,39 +2089,39 @@
         </p:nvSpPr>
         <p:spPr>
           <a:xfrm>
-            <a:off x="788418" y="15806063"/>
-            <a:ext cx="8830270" cy="4740037"/>
+            <a:off x="844683" y="20063259"/>
+            <a:ext cx="9460441" cy="6016715"/>
           </a:xfrm>
         </p:spPr>
         <p:txBody>
           <a:bodyPr lIns="91440" tIns="182880"/>
           <a:lstStyle>
             <a:lvl1pPr>
-              <a:defRPr sz="2079" baseline="0"/>
+              <a:defRPr sz="1950" baseline="0"/>
             </a:lvl1pPr>
             <a:lvl2pPr>
-              <a:defRPr sz="1819"/>
+              <a:defRPr sz="1706"/>
             </a:lvl2pPr>
             <a:lvl3pPr>
-              <a:defRPr sz="1819"/>
+              <a:defRPr sz="1706"/>
             </a:lvl3pPr>
             <a:lvl4pPr>
-              <a:defRPr sz="1819"/>
+              <a:defRPr sz="1706"/>
             </a:lvl4pPr>
             <a:lvl5pPr>
-              <a:defRPr sz="1819"/>
+              <a:defRPr sz="1706"/>
             </a:lvl5pPr>
             <a:lvl6pPr>
-              <a:defRPr sz="1819"/>
+              <a:defRPr sz="1706"/>
             </a:lvl6pPr>
             <a:lvl7pPr>
-              <a:defRPr sz="1819"/>
+              <a:defRPr sz="1706"/>
             </a:lvl7pPr>
             <a:lvl8pPr>
-              <a:defRPr sz="1819"/>
+              <a:defRPr sz="1706"/>
             </a:lvl8pPr>
             <a:lvl9pPr>
-              <a:defRPr sz="1819"/>
+              <a:defRPr sz="1706"/>
             </a:lvl9pPr>
           </a:lstStyle>
           <a:p>
@@ -2201,8 +2201,8 @@
         </p:nvSpPr>
         <p:spPr>
           <a:xfrm>
-            <a:off x="10722473" y="3682735"/>
-            <a:ext cx="8830270" cy="791986"/>
+            <a:off x="11487681" y="4674640"/>
+            <a:ext cx="9460441" cy="1005299"/>
           </a:xfrm>
           <a:prstGeom prst="rect">
             <a:avLst/>
@@ -2241,7 +2241,7 @@
                 <a:spcPts val="0"/>
               </a:spcBef>
               <a:buNone/>
-              <a:defRPr sz="3508" cap="none" baseline="0">
+              <a:defRPr sz="3291" cap="none" baseline="0">
                 <a:solidFill>
                   <a:schemeClr val="bg1"/>
                 </a:solidFill>
@@ -2253,7 +2253,7 @@
                 <a:spcPts val="0"/>
               </a:spcBef>
               <a:buNone/>
-              <a:defRPr sz="3898" cap="all" baseline="0">
+              <a:defRPr sz="3656" cap="all" baseline="0">
                 <a:solidFill>
                   <a:schemeClr val="bg1"/>
                 </a:solidFill>
@@ -2265,7 +2265,7 @@
                 <a:spcPts val="0"/>
               </a:spcBef>
               <a:buNone/>
-              <a:defRPr sz="3898" cap="all" baseline="0">
+              <a:defRPr sz="3656" cap="all" baseline="0">
                 <a:solidFill>
                   <a:schemeClr val="bg1"/>
                 </a:solidFill>
@@ -2277,7 +2277,7 @@
                 <a:spcPts val="0"/>
               </a:spcBef>
               <a:buNone/>
-              <a:defRPr sz="3898" cap="all" baseline="0">
+              <a:defRPr sz="3656" cap="all" baseline="0">
                 <a:solidFill>
                   <a:schemeClr val="bg1"/>
                 </a:solidFill>
@@ -2289,7 +2289,7 @@
                 <a:spcPts val="0"/>
               </a:spcBef>
               <a:buNone/>
-              <a:defRPr sz="3898" cap="all" baseline="0">
+              <a:defRPr sz="3656" cap="all" baseline="0">
                 <a:solidFill>
                   <a:schemeClr val="bg1"/>
                 </a:solidFill>
@@ -2301,7 +2301,7 @@
                 <a:spcPts val="0"/>
               </a:spcBef>
               <a:buNone/>
-              <a:defRPr sz="3898" cap="all" baseline="0">
+              <a:defRPr sz="3656" cap="all" baseline="0">
                 <a:solidFill>
                   <a:schemeClr val="bg1"/>
                 </a:solidFill>
@@ -2313,7 +2313,7 @@
                 <a:spcPts val="0"/>
               </a:spcBef>
               <a:buNone/>
-              <a:defRPr sz="3898" cap="all" baseline="0">
+              <a:defRPr sz="3656" cap="all" baseline="0">
                 <a:solidFill>
                   <a:schemeClr val="bg1"/>
                 </a:solidFill>
@@ -2325,7 +2325,7 @@
                 <a:spcPts val="0"/>
               </a:spcBef>
               <a:buNone/>
-              <a:defRPr sz="3898" cap="all" baseline="0">
+              <a:defRPr sz="3656" cap="all" baseline="0">
                 <a:solidFill>
                   <a:schemeClr val="bg1"/>
                 </a:solidFill>
@@ -2337,7 +2337,7 @@
                 <a:spcPts val="0"/>
               </a:spcBef>
               <a:buNone/>
-              <a:defRPr sz="3898" cap="all" baseline="0">
+              <a:defRPr sz="3656" cap="all" baseline="0">
                 <a:solidFill>
                   <a:schemeClr val="bg1"/>
                 </a:solidFill>
@@ -2366,39 +2366,39 @@
         </p:nvSpPr>
         <p:spPr>
           <a:xfrm>
-            <a:off x="10722473" y="4621241"/>
-            <a:ext cx="8830270" cy="4414359"/>
+            <a:off x="11487681" y="5865927"/>
+            <a:ext cx="9460441" cy="5603319"/>
           </a:xfrm>
         </p:spPr>
         <p:txBody>
           <a:bodyPr lIns="91440" tIns="182880"/>
           <a:lstStyle>
             <a:lvl1pPr>
-              <a:defRPr sz="2079" baseline="0"/>
+              <a:defRPr sz="1950" baseline="0"/>
             </a:lvl1pPr>
             <a:lvl2pPr>
-              <a:defRPr sz="1819"/>
+              <a:defRPr sz="1706"/>
             </a:lvl2pPr>
             <a:lvl3pPr>
-              <a:defRPr sz="1819"/>
+              <a:defRPr sz="1706"/>
             </a:lvl3pPr>
             <a:lvl4pPr>
-              <a:defRPr sz="1819"/>
+              <a:defRPr sz="1706"/>
             </a:lvl4pPr>
             <a:lvl5pPr>
-              <a:defRPr sz="1819"/>
+              <a:defRPr sz="1706"/>
             </a:lvl5pPr>
             <a:lvl6pPr>
-              <a:defRPr sz="1819"/>
+              <a:defRPr sz="1706"/>
             </a:lvl6pPr>
             <a:lvl7pPr>
-              <a:defRPr sz="1819"/>
+              <a:defRPr sz="1706"/>
             </a:lvl7pPr>
             <a:lvl8pPr>
-              <a:defRPr sz="1819"/>
+              <a:defRPr sz="1706"/>
             </a:lvl8pPr>
             <a:lvl9pPr>
-              <a:defRPr sz="1819"/>
+              <a:defRPr sz="1706"/>
             </a:lvl9pPr>
           </a:lstStyle>
           <a:p>
@@ -2478,8 +2478,8 @@
         </p:nvSpPr>
         <p:spPr>
           <a:xfrm>
-            <a:off x="10722473" y="9307817"/>
-            <a:ext cx="8830270" cy="791986"/>
+            <a:off x="11487681" y="11814778"/>
+            <a:ext cx="9460441" cy="1005299"/>
           </a:xfrm>
           <a:prstGeom prst="rect">
             <a:avLst/>
@@ -2518,7 +2518,7 @@
                 <a:spcPts val="0"/>
               </a:spcBef>
               <a:buNone/>
-              <a:defRPr sz="3508" cap="none" baseline="0">
+              <a:defRPr sz="3291" cap="none" baseline="0">
                 <a:solidFill>
                   <a:schemeClr val="bg1"/>
                 </a:solidFill>
@@ -2530,7 +2530,7 @@
                 <a:spcPts val="0"/>
               </a:spcBef>
               <a:buNone/>
-              <a:defRPr sz="3898" cap="all" baseline="0">
+              <a:defRPr sz="3656" cap="all" baseline="0">
                 <a:solidFill>
                   <a:schemeClr val="bg1"/>
                 </a:solidFill>
@@ -2542,7 +2542,7 @@
                 <a:spcPts val="0"/>
               </a:spcBef>
               <a:buNone/>
-              <a:defRPr sz="3898" cap="all" baseline="0">
+              <a:defRPr sz="3656" cap="all" baseline="0">
                 <a:solidFill>
                   <a:schemeClr val="bg1"/>
                 </a:solidFill>
@@ -2554,7 +2554,7 @@
                 <a:spcPts val="0"/>
               </a:spcBef>
               <a:buNone/>
-              <a:defRPr sz="3898" cap="all" baseline="0">
+              <a:defRPr sz="3656" cap="all" baseline="0">
                 <a:solidFill>
                   <a:schemeClr val="bg1"/>
                 </a:solidFill>
@@ -2566,7 +2566,7 @@
                 <a:spcPts val="0"/>
               </a:spcBef>
               <a:buNone/>
-              <a:defRPr sz="3898" cap="all" baseline="0">
+              <a:defRPr sz="3656" cap="all" baseline="0">
                 <a:solidFill>
                   <a:schemeClr val="bg1"/>
                 </a:solidFill>
@@ -2578,7 +2578,7 @@
                 <a:spcPts val="0"/>
               </a:spcBef>
               <a:buNone/>
-              <a:defRPr sz="3898" cap="all" baseline="0">
+              <a:defRPr sz="3656" cap="all" baseline="0">
                 <a:solidFill>
                   <a:schemeClr val="bg1"/>
                 </a:solidFill>
@@ -2590,7 +2590,7 @@
                 <a:spcPts val="0"/>
               </a:spcBef>
               <a:buNone/>
-              <a:defRPr sz="3898" cap="all" baseline="0">
+              <a:defRPr sz="3656" cap="all" baseline="0">
                 <a:solidFill>
                   <a:schemeClr val="bg1"/>
                 </a:solidFill>
@@ -2602,7 +2602,7 @@
                 <a:spcPts val="0"/>
               </a:spcBef>
               <a:buNone/>
-              <a:defRPr sz="3898" cap="all" baseline="0">
+              <a:defRPr sz="3656" cap="all" baseline="0">
                 <a:solidFill>
                   <a:schemeClr val="bg1"/>
                 </a:solidFill>
@@ -2614,7 +2614,7 @@
                 <a:spcPts val="0"/>
               </a:spcBef>
               <a:buNone/>
-              <a:defRPr sz="3898" cap="all" baseline="0">
+              <a:defRPr sz="3656" cap="all" baseline="0">
                 <a:solidFill>
                   <a:schemeClr val="bg1"/>
                 </a:solidFill>
@@ -2643,39 +2643,39 @@
         </p:nvSpPr>
         <p:spPr>
           <a:xfrm>
-            <a:off x="10722473" y="10246320"/>
-            <a:ext cx="8830270" cy="4349020"/>
+            <a:off x="11487681" y="13006057"/>
+            <a:ext cx="9460441" cy="5520382"/>
           </a:xfrm>
         </p:spPr>
         <p:txBody>
           <a:bodyPr lIns="91440" tIns="182880"/>
           <a:lstStyle>
             <a:lvl1pPr>
-              <a:defRPr sz="2079" baseline="0"/>
+              <a:defRPr sz="1950" baseline="0"/>
             </a:lvl1pPr>
             <a:lvl2pPr>
-              <a:defRPr sz="1819"/>
+              <a:defRPr sz="1706"/>
             </a:lvl2pPr>
             <a:lvl3pPr>
-              <a:defRPr sz="1819"/>
+              <a:defRPr sz="1706"/>
             </a:lvl3pPr>
             <a:lvl4pPr>
-              <a:defRPr sz="1819"/>
+              <a:defRPr sz="1706"/>
             </a:lvl4pPr>
             <a:lvl5pPr>
-              <a:defRPr sz="1819"/>
+              <a:defRPr sz="1706"/>
             </a:lvl5pPr>
             <a:lvl6pPr>
-              <a:defRPr sz="1819"/>
+              <a:defRPr sz="1706"/>
             </a:lvl6pPr>
             <a:lvl7pPr>
-              <a:defRPr sz="1819"/>
+              <a:defRPr sz="1706"/>
             </a:lvl7pPr>
             <a:lvl8pPr>
-              <a:defRPr sz="1819"/>
+              <a:defRPr sz="1706"/>
             </a:lvl8pPr>
             <a:lvl9pPr>
-              <a:defRPr sz="1819"/>
+              <a:defRPr sz="1706"/>
             </a:lvl9pPr>
           </a:lstStyle>
           <a:p>
@@ -2755,8 +2755,8 @@
         </p:nvSpPr>
         <p:spPr>
           <a:xfrm>
-            <a:off x="10722473" y="14867559"/>
-            <a:ext cx="8830270" cy="791986"/>
+            <a:off x="11487681" y="18871977"/>
+            <a:ext cx="9460441" cy="1005299"/>
           </a:xfrm>
           <a:prstGeom prst="rect">
             <a:avLst/>
@@ -2795,7 +2795,7 @@
                 <a:spcPts val="0"/>
               </a:spcBef>
               <a:buNone/>
-              <a:defRPr sz="3508" cap="none" baseline="0">
+              <a:defRPr sz="3291" cap="none" baseline="0">
                 <a:solidFill>
                   <a:schemeClr val="bg1"/>
                 </a:solidFill>
@@ -2807,7 +2807,7 @@
                 <a:spcPts val="0"/>
               </a:spcBef>
               <a:buNone/>
-              <a:defRPr sz="3898" cap="all" baseline="0">
+              <a:defRPr sz="3656" cap="all" baseline="0">
                 <a:solidFill>
                   <a:schemeClr val="bg1"/>
                 </a:solidFill>
@@ -2819,7 +2819,7 @@
                 <a:spcPts val="0"/>
               </a:spcBef>
               <a:buNone/>
-              <a:defRPr sz="3898" cap="all" baseline="0">
+              <a:defRPr sz="3656" cap="all" baseline="0">
                 <a:solidFill>
                   <a:schemeClr val="bg1"/>
                 </a:solidFill>
@@ -2831,7 +2831,7 @@
                 <a:spcPts val="0"/>
               </a:spcBef>
               <a:buNone/>
-              <a:defRPr sz="3898" cap="all" baseline="0">
+              <a:defRPr sz="3656" cap="all" baseline="0">
                 <a:solidFill>
                   <a:schemeClr val="bg1"/>
                 </a:solidFill>
@@ -2843,7 +2843,7 @@
                 <a:spcPts val="0"/>
               </a:spcBef>
               <a:buNone/>
-              <a:defRPr sz="3898" cap="all" baseline="0">
+              <a:defRPr sz="3656" cap="all" baseline="0">
                 <a:solidFill>
                   <a:schemeClr val="bg1"/>
                 </a:solidFill>
@@ -2855,7 +2855,7 @@
                 <a:spcPts val="0"/>
               </a:spcBef>
               <a:buNone/>
-              <a:defRPr sz="3898" cap="all" baseline="0">
+              <a:defRPr sz="3656" cap="all" baseline="0">
                 <a:solidFill>
                   <a:schemeClr val="bg1"/>
                 </a:solidFill>
@@ -2867,7 +2867,7 @@
                 <a:spcPts val="0"/>
               </a:spcBef>
               <a:buNone/>
-              <a:defRPr sz="3898" cap="all" baseline="0">
+              <a:defRPr sz="3656" cap="all" baseline="0">
                 <a:solidFill>
                   <a:schemeClr val="bg1"/>
                 </a:solidFill>
@@ -2879,7 +2879,7 @@
                 <a:spcPts val="0"/>
               </a:spcBef>
               <a:buNone/>
-              <a:defRPr sz="3898" cap="all" baseline="0">
+              <a:defRPr sz="3656" cap="all" baseline="0">
                 <a:solidFill>
                   <a:schemeClr val="bg1"/>
                 </a:solidFill>
@@ -2891,7 +2891,7 @@
                 <a:spcPts val="0"/>
               </a:spcBef>
               <a:buNone/>
-              <a:defRPr sz="3898" cap="all" baseline="0">
+              <a:defRPr sz="3656" cap="all" baseline="0">
                 <a:solidFill>
                   <a:schemeClr val="bg1"/>
                 </a:solidFill>
@@ -2920,39 +2920,39 @@
         </p:nvSpPr>
         <p:spPr>
           <a:xfrm>
-            <a:off x="10722473" y="15806063"/>
-            <a:ext cx="8830270" cy="4740037"/>
+            <a:off x="11487681" y="20063259"/>
+            <a:ext cx="9460441" cy="6016715"/>
           </a:xfrm>
         </p:spPr>
         <p:txBody>
           <a:bodyPr lIns="91440" tIns="182880"/>
           <a:lstStyle>
             <a:lvl1pPr>
-              <a:defRPr sz="2079" baseline="0"/>
+              <a:defRPr sz="1950" baseline="0"/>
             </a:lvl1pPr>
             <a:lvl2pPr>
-              <a:defRPr sz="1819"/>
+              <a:defRPr sz="1706"/>
             </a:lvl2pPr>
             <a:lvl3pPr>
-              <a:defRPr sz="1819"/>
+              <a:defRPr sz="1706"/>
             </a:lvl3pPr>
             <a:lvl4pPr>
-              <a:defRPr sz="1819"/>
+              <a:defRPr sz="1706"/>
             </a:lvl4pPr>
             <a:lvl5pPr>
-              <a:defRPr sz="1819"/>
+              <a:defRPr sz="1706"/>
             </a:lvl5pPr>
             <a:lvl6pPr>
-              <a:defRPr sz="1819"/>
+              <a:defRPr sz="1706"/>
             </a:lvl6pPr>
             <a:lvl7pPr>
-              <a:defRPr sz="1819"/>
+              <a:defRPr sz="1706"/>
             </a:lvl7pPr>
             <a:lvl8pPr>
-              <a:defRPr sz="1819"/>
+              <a:defRPr sz="1706"/>
             </a:lvl8pPr>
             <a:lvl9pPr>
-              <a:defRPr sz="1819"/>
+              <a:defRPr sz="1706"/>
             </a:lvl9pPr>
           </a:lstStyle>
           <a:p>
@@ -3032,8 +3032,8 @@
         </p:nvSpPr>
         <p:spPr>
           <a:xfrm>
-            <a:off x="20624990" y="3682735"/>
-            <a:ext cx="8830270" cy="791986"/>
+            <a:off x="22096890" y="4674640"/>
+            <a:ext cx="9460441" cy="1005299"/>
           </a:xfrm>
           <a:prstGeom prst="rect">
             <a:avLst/>
@@ -3072,7 +3072,7 @@
                 <a:spcPts val="0"/>
               </a:spcBef>
               <a:buNone/>
-              <a:defRPr sz="3508" cap="none" baseline="0">
+              <a:defRPr sz="3291" cap="none" baseline="0">
                 <a:solidFill>
                   <a:schemeClr val="bg1"/>
                 </a:solidFill>
@@ -3084,7 +3084,7 @@
                 <a:spcPts val="0"/>
               </a:spcBef>
               <a:buNone/>
-              <a:defRPr sz="3898" cap="all" baseline="0">
+              <a:defRPr sz="3656" cap="all" baseline="0">
                 <a:solidFill>
                   <a:schemeClr val="bg1"/>
                 </a:solidFill>
@@ -3096,7 +3096,7 @@
                 <a:spcPts val="0"/>
               </a:spcBef>
               <a:buNone/>
-              <a:defRPr sz="3898" cap="all" baseline="0">
+              <a:defRPr sz="3656" cap="all" baseline="0">
                 <a:solidFill>
                   <a:schemeClr val="bg1"/>
                 </a:solidFill>
@@ -3108,7 +3108,7 @@
                 <a:spcPts val="0"/>
               </a:spcBef>
               <a:buNone/>
-              <a:defRPr sz="3898" cap="all" baseline="0">
+              <a:defRPr sz="3656" cap="all" baseline="0">
                 <a:solidFill>
                   <a:schemeClr val="bg1"/>
                 </a:solidFill>
@@ -3120,7 +3120,7 @@
                 <a:spcPts val="0"/>
               </a:spcBef>
               <a:buNone/>
-              <a:defRPr sz="3898" cap="all" baseline="0">
+              <a:defRPr sz="3656" cap="all" baseline="0">
                 <a:solidFill>
                   <a:schemeClr val="bg1"/>
                 </a:solidFill>
@@ -3132,7 +3132,7 @@
                 <a:spcPts val="0"/>
               </a:spcBef>
               <a:buNone/>
-              <a:defRPr sz="3898" cap="all" baseline="0">
+              <a:defRPr sz="3656" cap="all" baseline="0">
                 <a:solidFill>
                   <a:schemeClr val="bg1"/>
                 </a:solidFill>
@@ -3144,7 +3144,7 @@
                 <a:spcPts val="0"/>
               </a:spcBef>
               <a:buNone/>
-              <a:defRPr sz="3898" cap="all" baseline="0">
+              <a:defRPr sz="3656" cap="all" baseline="0">
                 <a:solidFill>
                   <a:schemeClr val="bg1"/>
                 </a:solidFill>
@@ -3156,7 +3156,7 @@
                 <a:spcPts val="0"/>
               </a:spcBef>
               <a:buNone/>
-              <a:defRPr sz="3898" cap="all" baseline="0">
+              <a:defRPr sz="3656" cap="all" baseline="0">
                 <a:solidFill>
                   <a:schemeClr val="bg1"/>
                 </a:solidFill>
@@ -3168,7 +3168,7 @@
                 <a:spcPts val="0"/>
               </a:spcBef>
               <a:buNone/>
-              <a:defRPr sz="3898" cap="all" baseline="0">
+              <a:defRPr sz="3656" cap="all" baseline="0">
                 <a:solidFill>
                   <a:schemeClr val="bg1"/>
                 </a:solidFill>
@@ -3197,39 +3197,39 @@
         </p:nvSpPr>
         <p:spPr>
           <a:xfrm>
-            <a:off x="20624990" y="4621241"/>
-            <a:ext cx="8830270" cy="4751917"/>
+            <a:off x="22096890" y="5865927"/>
+            <a:ext cx="9460441" cy="6031795"/>
           </a:xfrm>
         </p:spPr>
         <p:txBody>
           <a:bodyPr lIns="91440" tIns="182880"/>
           <a:lstStyle>
             <a:lvl1pPr>
-              <a:defRPr sz="2079" baseline="0"/>
+              <a:defRPr sz="1950" baseline="0"/>
             </a:lvl1pPr>
             <a:lvl2pPr>
-              <a:defRPr sz="1819"/>
+              <a:defRPr sz="1706"/>
             </a:lvl2pPr>
             <a:lvl3pPr>
-              <a:defRPr sz="1819"/>
+              <a:defRPr sz="1706"/>
             </a:lvl3pPr>
             <a:lvl4pPr>
-              <a:defRPr sz="1819"/>
+              <a:defRPr sz="1706"/>
             </a:lvl4pPr>
             <a:lvl5pPr>
-              <a:defRPr sz="1819"/>
+              <a:defRPr sz="1706"/>
             </a:lvl5pPr>
             <a:lvl6pPr>
-              <a:defRPr sz="1819"/>
+              <a:defRPr sz="1706"/>
             </a:lvl6pPr>
             <a:lvl7pPr>
-              <a:defRPr sz="1819"/>
+              <a:defRPr sz="1706"/>
             </a:lvl7pPr>
             <a:lvl8pPr>
-              <a:defRPr sz="1819"/>
+              <a:defRPr sz="1706"/>
             </a:lvl8pPr>
             <a:lvl9pPr>
-              <a:defRPr sz="1819"/>
+              <a:defRPr sz="1706"/>
             </a:lvl9pPr>
           </a:lstStyle>
           <a:p>
@@ -3309,39 +3309,39 @@
         </p:nvSpPr>
         <p:spPr>
           <a:xfrm>
-            <a:off x="20624990" y="9688600"/>
-            <a:ext cx="8830270" cy="2948258"/>
+            <a:off x="22096890" y="12298120"/>
+            <a:ext cx="9460441" cy="3742340"/>
           </a:xfrm>
         </p:spPr>
         <p:txBody>
           <a:bodyPr lIns="91440" tIns="182880"/>
           <a:lstStyle>
             <a:lvl1pPr>
-              <a:defRPr sz="2079" baseline="0"/>
+              <a:defRPr sz="1950" baseline="0"/>
             </a:lvl1pPr>
             <a:lvl2pPr>
-              <a:defRPr sz="1819"/>
+              <a:defRPr sz="1706"/>
             </a:lvl2pPr>
             <a:lvl3pPr>
-              <a:defRPr sz="1819"/>
+              <a:defRPr sz="1706"/>
             </a:lvl3pPr>
             <a:lvl4pPr>
-              <a:defRPr sz="1819"/>
+              <a:defRPr sz="1706"/>
             </a:lvl4pPr>
             <a:lvl5pPr>
-              <a:defRPr sz="1819"/>
+              <a:defRPr sz="1706"/>
             </a:lvl5pPr>
             <a:lvl6pPr>
-              <a:defRPr sz="1819"/>
+              <a:defRPr sz="1706"/>
             </a:lvl6pPr>
             <a:lvl7pPr>
-              <a:defRPr sz="1819"/>
+              <a:defRPr sz="1706"/>
             </a:lvl7pPr>
             <a:lvl8pPr>
-              <a:defRPr sz="1819"/>
+              <a:defRPr sz="1706"/>
             </a:lvl8pPr>
             <a:lvl9pPr>
-              <a:defRPr sz="1819"/>
+              <a:defRPr sz="1706"/>
             </a:lvl9pPr>
           </a:lstStyle>
           <a:p>
@@ -3386,8 +3386,8 @@
         </p:nvSpPr>
         <p:spPr>
           <a:xfrm>
-            <a:off x="20624990" y="12840930"/>
-            <a:ext cx="8830270" cy="791986"/>
+            <a:off x="22096890" y="16299497"/>
+            <a:ext cx="9460441" cy="1005299"/>
           </a:xfrm>
           <a:prstGeom prst="rect">
             <a:avLst/>
@@ -3426,7 +3426,7 @@
                 <a:spcPts val="0"/>
               </a:spcBef>
               <a:buNone/>
-              <a:defRPr sz="3508" cap="none" baseline="0">
+              <a:defRPr sz="3291" cap="none" baseline="0">
                 <a:solidFill>
                   <a:schemeClr val="bg1"/>
                 </a:solidFill>
@@ -3438,7 +3438,7 @@
                 <a:spcPts val="0"/>
               </a:spcBef>
               <a:buNone/>
-              <a:defRPr sz="3898" cap="all" baseline="0">
+              <a:defRPr sz="3656" cap="all" baseline="0">
                 <a:solidFill>
                   <a:schemeClr val="bg1"/>
                 </a:solidFill>
@@ -3450,7 +3450,7 @@
                 <a:spcPts val="0"/>
               </a:spcBef>
               <a:buNone/>
-              <a:defRPr sz="3898" cap="all" baseline="0">
+              <a:defRPr sz="3656" cap="all" baseline="0">
                 <a:solidFill>
                   <a:schemeClr val="bg1"/>
                 </a:solidFill>
@@ -3462,7 +3462,7 @@
                 <a:spcPts val="0"/>
               </a:spcBef>
               <a:buNone/>
-              <a:defRPr sz="3898" cap="all" baseline="0">
+              <a:defRPr sz="3656" cap="all" baseline="0">
                 <a:solidFill>
                   <a:schemeClr val="bg1"/>
                 </a:solidFill>
@@ -3474,7 +3474,7 @@
                 <a:spcPts val="0"/>
               </a:spcBef>
               <a:buNone/>
-              <a:defRPr sz="3898" cap="all" baseline="0">
+              <a:defRPr sz="3656" cap="all" baseline="0">
                 <a:solidFill>
                   <a:schemeClr val="bg1"/>
                 </a:solidFill>
@@ -3486,7 +3486,7 @@
                 <a:spcPts val="0"/>
               </a:spcBef>
               <a:buNone/>
-              <a:defRPr sz="3898" cap="all" baseline="0">
+              <a:defRPr sz="3656" cap="all" baseline="0">
                 <a:solidFill>
                   <a:schemeClr val="bg1"/>
                 </a:solidFill>
@@ -3498,7 +3498,7 @@
                 <a:spcPts val="0"/>
               </a:spcBef>
               <a:buNone/>
-              <a:defRPr sz="3898" cap="all" baseline="0">
+              <a:defRPr sz="3656" cap="all" baseline="0">
                 <a:solidFill>
                   <a:schemeClr val="bg1"/>
                 </a:solidFill>
@@ -3510,7 +3510,7 @@
                 <a:spcPts val="0"/>
               </a:spcBef>
               <a:buNone/>
-              <a:defRPr sz="3898" cap="all" baseline="0">
+              <a:defRPr sz="3656" cap="all" baseline="0">
                 <a:solidFill>
                   <a:schemeClr val="bg1"/>
                 </a:solidFill>
@@ -3522,7 +3522,7 @@
                 <a:spcPts val="0"/>
               </a:spcBef>
               <a:buNone/>
-              <a:defRPr sz="3898" cap="all" baseline="0">
+              <a:defRPr sz="3656" cap="all" baseline="0">
                 <a:solidFill>
                   <a:schemeClr val="bg1"/>
                 </a:solidFill>
@@ -3551,39 +3551,39 @@
         </p:nvSpPr>
         <p:spPr>
           <a:xfrm>
-            <a:off x="20624990" y="13779435"/>
-            <a:ext cx="8830270" cy="2822351"/>
+            <a:off x="22096890" y="17490782"/>
+            <a:ext cx="9460441" cy="3582521"/>
           </a:xfrm>
         </p:spPr>
         <p:txBody>
           <a:bodyPr lIns="91440" tIns="182880"/>
           <a:lstStyle>
             <a:lvl1pPr>
-              <a:defRPr sz="2079" baseline="0"/>
+              <a:defRPr sz="1950" baseline="0"/>
             </a:lvl1pPr>
             <a:lvl2pPr>
-              <a:defRPr sz="1819"/>
+              <a:defRPr sz="1706"/>
             </a:lvl2pPr>
             <a:lvl3pPr>
-              <a:defRPr sz="1819"/>
+              <a:defRPr sz="1706"/>
             </a:lvl3pPr>
             <a:lvl4pPr>
-              <a:defRPr sz="1819"/>
+              <a:defRPr sz="1706"/>
             </a:lvl4pPr>
             <a:lvl5pPr>
-              <a:defRPr sz="1819"/>
+              <a:defRPr sz="1706"/>
             </a:lvl5pPr>
             <a:lvl6pPr>
-              <a:defRPr sz="1819"/>
+              <a:defRPr sz="1706"/>
             </a:lvl6pPr>
             <a:lvl7pPr>
-              <a:defRPr sz="1819"/>
+              <a:defRPr sz="1706"/>
             </a:lvl7pPr>
             <a:lvl8pPr>
-              <a:defRPr sz="1819"/>
+              <a:defRPr sz="1706"/>
             </a:lvl8pPr>
             <a:lvl9pPr>
-              <a:defRPr sz="1819"/>
+              <a:defRPr sz="1706"/>
             </a:lvl9pPr>
           </a:lstStyle>
           <a:p>
@@ -3628,8 +3628,8 @@
         </p:nvSpPr>
         <p:spPr>
           <a:xfrm>
-            <a:off x="20624990" y="16708927"/>
-            <a:ext cx="8830270" cy="791986"/>
+            <a:off x="22096890" y="21209297"/>
+            <a:ext cx="9460441" cy="1005299"/>
           </a:xfrm>
           <a:prstGeom prst="rect">
             <a:avLst/>
@@ -3668,7 +3668,7 @@
                 <a:spcPts val="0"/>
               </a:spcBef>
               <a:buNone/>
-              <a:defRPr sz="3508" cap="none" baseline="0">
+              <a:defRPr sz="3291" cap="none" baseline="0">
                 <a:solidFill>
                   <a:schemeClr val="bg1"/>
                 </a:solidFill>
@@ -3680,7 +3680,7 @@
                 <a:spcPts val="0"/>
               </a:spcBef>
               <a:buNone/>
-              <a:defRPr sz="3898" cap="all" baseline="0">
+              <a:defRPr sz="3656" cap="all" baseline="0">
                 <a:solidFill>
                   <a:schemeClr val="bg1"/>
                 </a:solidFill>
@@ -3692,7 +3692,7 @@
                 <a:spcPts val="0"/>
               </a:spcBef>
               <a:buNone/>
-              <a:defRPr sz="3898" cap="all" baseline="0">
+              <a:defRPr sz="3656" cap="all" baseline="0">
                 <a:solidFill>
                   <a:schemeClr val="bg1"/>
                 </a:solidFill>
@@ -3704,7 +3704,7 @@
                 <a:spcPts val="0"/>
               </a:spcBef>
               <a:buNone/>
-              <a:defRPr sz="3898" cap="all" baseline="0">
+              <a:defRPr sz="3656" cap="all" baseline="0">
                 <a:solidFill>
                   <a:schemeClr val="bg1"/>
                 </a:solidFill>
@@ -3716,7 +3716,7 @@
                 <a:spcPts val="0"/>
               </a:spcBef>
               <a:buNone/>
-              <a:defRPr sz="3898" cap="all" baseline="0">
+              <a:defRPr sz="3656" cap="all" baseline="0">
                 <a:solidFill>
                   <a:schemeClr val="bg1"/>
                 </a:solidFill>
@@ -3728,7 +3728,7 @@
                 <a:spcPts val="0"/>
               </a:spcBef>
               <a:buNone/>
-              <a:defRPr sz="3898" cap="all" baseline="0">
+              <a:defRPr sz="3656" cap="all" baseline="0">
                 <a:solidFill>
                   <a:schemeClr val="bg1"/>
                 </a:solidFill>
@@ -3740,7 +3740,7 @@
                 <a:spcPts val="0"/>
               </a:spcBef>
               <a:buNone/>
-              <a:defRPr sz="3898" cap="all" baseline="0">
+              <a:defRPr sz="3656" cap="all" baseline="0">
                 <a:solidFill>
                   <a:schemeClr val="bg1"/>
                 </a:solidFill>
@@ -3752,7 +3752,7 @@
                 <a:spcPts val="0"/>
               </a:spcBef>
               <a:buNone/>
-              <a:defRPr sz="3898" cap="all" baseline="0">
+              <a:defRPr sz="3656" cap="all" baseline="0">
                 <a:solidFill>
                   <a:schemeClr val="bg1"/>
                 </a:solidFill>
@@ -3764,7 +3764,7 @@
                 <a:spcPts val="0"/>
               </a:spcBef>
               <a:buNone/>
-              <a:defRPr sz="3898" cap="all" baseline="0">
+              <a:defRPr sz="3656" cap="all" baseline="0">
                 <a:solidFill>
                   <a:schemeClr val="bg1"/>
                 </a:solidFill>
@@ -3793,39 +3793,39 @@
         </p:nvSpPr>
         <p:spPr>
           <a:xfrm>
-            <a:off x="20624990" y="17647432"/>
-            <a:ext cx="8830270" cy="2898669"/>
+            <a:off x="22096890" y="22400579"/>
+            <a:ext cx="9460441" cy="3679395"/>
           </a:xfrm>
         </p:spPr>
         <p:txBody>
           <a:bodyPr lIns="91440" tIns="182880"/>
           <a:lstStyle>
             <a:lvl1pPr>
-              <a:defRPr sz="2079" baseline="0"/>
+              <a:defRPr sz="1950" baseline="0"/>
             </a:lvl1pPr>
             <a:lvl2pPr>
-              <a:defRPr sz="1819"/>
+              <a:defRPr sz="1706"/>
             </a:lvl2pPr>
             <a:lvl3pPr>
-              <a:defRPr sz="1819"/>
+              <a:defRPr sz="1706"/>
             </a:lvl3pPr>
             <a:lvl4pPr>
-              <a:defRPr sz="1819"/>
+              <a:defRPr sz="1706"/>
             </a:lvl4pPr>
             <a:lvl5pPr>
-              <a:defRPr sz="1819"/>
+              <a:defRPr sz="1706"/>
             </a:lvl5pPr>
             <a:lvl6pPr>
-              <a:defRPr sz="1819"/>
+              <a:defRPr sz="1706"/>
             </a:lvl6pPr>
             <a:lvl7pPr>
-              <a:defRPr sz="1819"/>
+              <a:defRPr sz="1706"/>
             </a:lvl7pPr>
             <a:lvl8pPr>
-              <a:defRPr sz="1819"/>
+              <a:defRPr sz="1706"/>
             </a:lvl8pPr>
             <a:lvl9pPr>
-              <a:defRPr sz="1819"/>
+              <a:defRPr sz="1706"/>
             </a:lvl9pPr>
           </a:lstStyle>
           <a:p>
@@ -3949,8 +3949,8 @@
         </p:nvSpPr>
         <p:spPr>
           <a:xfrm>
-            <a:off x="22259642" y="3"/>
-            <a:ext cx="8015573" cy="2496033"/>
+            <a:off x="23848207" y="6"/>
+            <a:ext cx="8587603" cy="3168312"/>
           </a:xfrm>
           <a:effectDag name="">
             <a:cont type="tree" name="">
@@ -4013,12 +4013,12 @@
   <p:extLst mod="1">
     <p:ext uri="{DCECCB84-F9BA-43D5-87BE-67443E8EF086}">
       <p15:sldGuideLst xmlns:p15="http://schemas.microsoft.com/office/powerpoint/2012/main">
-        <p15:guide id="1" pos="6325" userDrawn="1">
+        <p15:guide id="1" pos="6776" userDrawn="1">
           <p15:clr>
             <a:srgbClr val="A4A3A4"/>
           </p15:clr>
         </p15:guide>
-        <p15:guide id="2" pos="12746" userDrawn="1">
+        <p15:guide id="2" pos="13656" userDrawn="1">
           <p15:clr>
             <a:srgbClr val="A4A3A4"/>
           </p15:clr>
@@ -4059,8 +4059,8 @@
         </p:nvSpPr>
         <p:spPr bwMode="ltGray">
           <a:xfrm>
-            <a:off x="2" y="2"/>
-            <a:ext cx="30275213" cy="3266943"/>
+            <a:off x="7" y="5"/>
+            <a:ext cx="32435800" cy="4146859"/>
           </a:xfrm>
           <a:prstGeom prst="rect">
             <a:avLst/>
@@ -4093,7 +4093,7 @@
           <a:lstStyle/>
           <a:p>
             <a:pPr algn="ctr"/>
-            <a:endParaRPr lang="en-US" sz="3171"/>
+            <a:endParaRPr lang="en-US" sz="2974"/>
           </a:p>
         </p:txBody>
       </p:sp>
@@ -4109,8 +4109,8 @@
         </p:nvSpPr>
         <p:spPr bwMode="auto">
           <a:xfrm>
-            <a:off x="798929" y="445531"/>
-            <a:ext cx="20814209" cy="1930427"/>
+            <a:off x="855952" y="565535"/>
+            <a:ext cx="22299613" cy="2450367"/>
           </a:xfrm>
           <a:prstGeom prst="rect">
             <a:avLst/>
@@ -4141,8 +4141,8 @@
         </p:nvSpPr>
         <p:spPr>
           <a:xfrm>
-            <a:off x="798931" y="3910431"/>
-            <a:ext cx="28687867" cy="15349682"/>
+            <a:off x="855949" y="4963664"/>
+            <a:ext cx="30735173" cy="19483954"/>
           </a:xfrm>
           <a:prstGeom prst="rect">
             <a:avLst/>
@@ -4202,8 +4202,8 @@
         </p:nvSpPr>
         <p:spPr>
           <a:xfrm>
-            <a:off x="788418" y="20861545"/>
-            <a:ext cx="6811924" cy="296995"/>
+            <a:off x="844683" y="26480383"/>
+            <a:ext cx="7298056" cy="376988"/>
           </a:xfrm>
           <a:prstGeom prst="rect">
             <a:avLst/>
@@ -4213,7 +4213,7 @@
           <a:bodyPr vert="horz" lIns="91440" tIns="45720" rIns="91440" bIns="45720" rtlCol="0" anchor="ctr"/>
           <a:lstStyle>
             <a:lvl1pPr algn="l">
-              <a:defRPr sz="1040">
+              <a:defRPr sz="975">
                 <a:solidFill>
                   <a:schemeClr val="tx1">
                     <a:tint val="75000"/>
@@ -4244,8 +4244,8 @@
         </p:nvSpPr>
         <p:spPr>
           <a:xfrm>
-            <a:off x="7600343" y="20861545"/>
-            <a:ext cx="15074532" cy="296995"/>
+            <a:off x="8142741" y="26480383"/>
+            <a:ext cx="16150324" cy="376988"/>
           </a:xfrm>
           <a:prstGeom prst="rect">
             <a:avLst/>
@@ -4255,7 +4255,7 @@
           <a:bodyPr vert="horz" lIns="91440" tIns="45720" rIns="91440" bIns="45720" rtlCol="0" anchor="ctr"/>
           <a:lstStyle>
             <a:lvl1pPr algn="ctr">
-              <a:defRPr sz="1040">
+              <a:defRPr sz="975">
                 <a:solidFill>
                   <a:schemeClr val="tx1">
                     <a:tint val="75000"/>
@@ -4281,8 +4281,8 @@
         </p:nvSpPr>
         <p:spPr>
           <a:xfrm>
-            <a:off x="22674875" y="20861545"/>
-            <a:ext cx="6811924" cy="296995"/>
+            <a:off x="24293065" y="26480383"/>
+            <a:ext cx="7298056" cy="376988"/>
           </a:xfrm>
           <a:prstGeom prst="rect">
             <a:avLst/>
@@ -4292,7 +4292,7 @@
           <a:bodyPr vert="horz" lIns="91440" tIns="45720" rIns="91440" bIns="45720" rtlCol="0" anchor="ctr"/>
           <a:lstStyle>
             <a:lvl1pPr algn="r">
-              <a:defRPr sz="1040">
+              <a:defRPr sz="975">
                 <a:solidFill>
                   <a:schemeClr val="tx1">
                     <a:tint val="75000"/>
@@ -4319,8 +4319,8 @@
         </p:nvSpPr>
         <p:spPr bwMode="gray">
           <a:xfrm>
-            <a:off x="2" y="2524457"/>
-            <a:ext cx="30275213" cy="742487"/>
+            <a:off x="7" y="3204393"/>
+            <a:ext cx="32435800" cy="942468"/>
           </a:xfrm>
           <a:prstGeom prst="rect">
             <a:avLst/>
@@ -4356,7 +4356,7 @@
           <a:lstStyle/>
           <a:p>
             <a:pPr algn="ctr"/>
-            <a:endParaRPr lang="en-US" sz="3171"/>
+            <a:endParaRPr lang="en-US" sz="2974"/>
           </a:p>
         </p:txBody>
       </p:sp>
@@ -4368,8 +4368,8 @@
         </p:nvCxnSpPr>
         <p:spPr>
           <a:xfrm>
-            <a:off x="2" y="2524456"/>
-            <a:ext cx="30275213" cy="0"/>
+            <a:off x="7" y="3204391"/>
+            <a:ext cx="32435800" cy="0"/>
           </a:xfrm>
           <a:prstGeom prst="line">
             <a:avLst/>
@@ -4406,7 +4406,7 @@
   </p:sldLayoutIdLst>
   <p:txStyles>
     <p:titleStyle>
-      <a:lvl1pPr algn="l" defTabSz="2851248" rtl="0" eaLnBrk="1" latinLnBrk="0" hangingPunct="1">
+      <a:lvl1pPr algn="l" defTabSz="2674224" rtl="0" eaLnBrk="1" latinLnBrk="0" hangingPunct="1">
         <a:lnSpc>
           <a:spcPct val="90000"/>
         </a:lnSpc>
@@ -4414,7 +4414,7 @@
           <a:spcPct val="0"/>
         </a:spcBef>
         <a:buNone/>
-        <a:defRPr sz="7471" b="0" kern="1200">
+        <a:defRPr sz="7008" b="0" kern="1200">
           <a:solidFill>
             <a:schemeClr val="bg1"/>
           </a:solidFill>
@@ -4425,12 +4425,12 @@
       </a:lvl1pPr>
     </p:titleStyle>
     <p:bodyStyle>
-      <a:lvl1pPr marL="297006" indent="-297006" algn="l" defTabSz="2851248" rtl="0" eaLnBrk="1" latinLnBrk="0" hangingPunct="1">
+      <a:lvl1pPr marL="278566" indent="-278566" algn="l" defTabSz="2674224" rtl="0" eaLnBrk="1" latinLnBrk="0" hangingPunct="1">
         <a:lnSpc>
           <a:spcPct val="100000"/>
         </a:lnSpc>
         <a:spcBef>
-          <a:spcPts val="780"/>
+          <a:spcPts val="731"/>
         </a:spcBef>
         <a:buClr>
           <a:schemeClr val="bg1">
@@ -4439,7 +4439,7 @@
         </a:buClr>
         <a:buFont typeface="Arial" panose="020B0604020202020204" pitchFamily="34" charset="0"/>
         <a:buChar char="•"/>
-        <a:defRPr sz="1819" kern="1200">
+        <a:defRPr sz="1706" kern="1200">
           <a:solidFill>
             <a:schemeClr val="tx1"/>
           </a:solidFill>
@@ -4448,12 +4448,12 @@
           <a:cs typeface="+mn-cs"/>
         </a:defRPr>
       </a:lvl1pPr>
-      <a:lvl2pPr marL="712813" indent="-297006" algn="l" defTabSz="2851248" rtl="0" eaLnBrk="1" latinLnBrk="0" hangingPunct="1">
+      <a:lvl2pPr marL="668557" indent="-278566" algn="l" defTabSz="2674224" rtl="0" eaLnBrk="1" latinLnBrk="0" hangingPunct="1">
         <a:lnSpc>
           <a:spcPct val="100000"/>
         </a:lnSpc>
         <a:spcBef>
-          <a:spcPts val="780"/>
+          <a:spcPts val="731"/>
         </a:spcBef>
         <a:buClr>
           <a:schemeClr val="bg1">
@@ -4462,7 +4462,7 @@
         </a:buClr>
         <a:buFont typeface="Arial" panose="020B0604020202020204" pitchFamily="34" charset="0"/>
         <a:buChar char="•"/>
-        <a:defRPr sz="1558" kern="1200">
+        <a:defRPr sz="1461" kern="1200">
           <a:solidFill>
             <a:schemeClr val="tx1"/>
           </a:solidFill>
@@ -4471,12 +4471,12 @@
           <a:cs typeface="+mn-cs"/>
         </a:defRPr>
       </a:lvl2pPr>
-      <a:lvl3pPr marL="712813" indent="-297006" algn="l" defTabSz="2851248" rtl="0" eaLnBrk="1" latinLnBrk="0" hangingPunct="1">
+      <a:lvl3pPr marL="668557" indent="-278566" algn="l" defTabSz="2674224" rtl="0" eaLnBrk="1" latinLnBrk="0" hangingPunct="1">
         <a:lnSpc>
           <a:spcPct val="100000"/>
         </a:lnSpc>
         <a:spcBef>
-          <a:spcPts val="780"/>
+          <a:spcPts val="731"/>
         </a:spcBef>
         <a:buClr>
           <a:schemeClr val="bg1">
@@ -4485,7 +4485,7 @@
         </a:buClr>
         <a:buFont typeface="Arial" panose="020B0604020202020204" pitchFamily="34" charset="0"/>
         <a:buChar char="•"/>
-        <a:defRPr sz="1558" kern="1200">
+        <a:defRPr sz="1461" kern="1200">
           <a:solidFill>
             <a:schemeClr val="tx1"/>
           </a:solidFill>
@@ -4494,12 +4494,12 @@
           <a:cs typeface="+mn-cs"/>
         </a:defRPr>
       </a:lvl3pPr>
-      <a:lvl4pPr marL="712813" indent="-297006" algn="l" defTabSz="2851248" rtl="0" eaLnBrk="1" latinLnBrk="0" hangingPunct="1">
+      <a:lvl4pPr marL="668557" indent="-278566" algn="l" defTabSz="2674224" rtl="0" eaLnBrk="1" latinLnBrk="0" hangingPunct="1">
         <a:lnSpc>
           <a:spcPct val="100000"/>
         </a:lnSpc>
         <a:spcBef>
-          <a:spcPts val="780"/>
+          <a:spcPts val="731"/>
         </a:spcBef>
         <a:buClr>
           <a:schemeClr val="bg1">
@@ -4508,7 +4508,7 @@
         </a:buClr>
         <a:buFont typeface="Arial" panose="020B0604020202020204" pitchFamily="34" charset="0"/>
         <a:buChar char="•"/>
-        <a:defRPr sz="1558" kern="1200">
+        <a:defRPr sz="1461" kern="1200">
           <a:solidFill>
             <a:schemeClr val="tx1"/>
           </a:solidFill>
@@ -4517,12 +4517,12 @@
           <a:cs typeface="+mn-cs"/>
         </a:defRPr>
       </a:lvl4pPr>
-      <a:lvl5pPr marL="712813" indent="-297006" algn="l" defTabSz="2851248" rtl="0" eaLnBrk="1" latinLnBrk="0" hangingPunct="1">
+      <a:lvl5pPr marL="668557" indent="-278566" algn="l" defTabSz="2674224" rtl="0" eaLnBrk="1" latinLnBrk="0" hangingPunct="1">
         <a:lnSpc>
           <a:spcPct val="100000"/>
         </a:lnSpc>
         <a:spcBef>
-          <a:spcPts val="780"/>
+          <a:spcPts val="731"/>
         </a:spcBef>
         <a:buClr>
           <a:schemeClr val="bg1">
@@ -4531,7 +4531,7 @@
         </a:buClr>
         <a:buFont typeface="Arial" panose="020B0604020202020204" pitchFamily="34" charset="0"/>
         <a:buChar char="•"/>
-        <a:defRPr sz="1558" kern="1200">
+        <a:defRPr sz="1461" kern="1200">
           <a:solidFill>
             <a:schemeClr val="tx1"/>
           </a:solidFill>
@@ -4540,12 +4540,12 @@
           <a:cs typeface="+mn-cs"/>
         </a:defRPr>
       </a:lvl5pPr>
-      <a:lvl6pPr marL="712813" indent="-297006" algn="l" defTabSz="2851248" rtl="0" eaLnBrk="1" latinLnBrk="0" hangingPunct="1">
+      <a:lvl6pPr marL="668557" indent="-278566" algn="l" defTabSz="2674224" rtl="0" eaLnBrk="1" latinLnBrk="0" hangingPunct="1">
         <a:lnSpc>
           <a:spcPct val="100000"/>
         </a:lnSpc>
         <a:spcBef>
-          <a:spcPts val="780"/>
+          <a:spcPts val="731"/>
         </a:spcBef>
         <a:buClr>
           <a:schemeClr val="bg1">
@@ -4554,7 +4554,7 @@
         </a:buClr>
         <a:buFont typeface="Arial" panose="020B0604020202020204" pitchFamily="34" charset="0"/>
         <a:buChar char="•"/>
-        <a:defRPr sz="1558" kern="1200">
+        <a:defRPr sz="1461" kern="1200">
           <a:solidFill>
             <a:schemeClr val="tx1"/>
           </a:solidFill>
@@ -4563,12 +4563,12 @@
           <a:cs typeface="+mn-cs"/>
         </a:defRPr>
       </a:lvl6pPr>
-      <a:lvl7pPr marL="712813" indent="-297006" algn="l" defTabSz="2851248" rtl="0" eaLnBrk="1" latinLnBrk="0" hangingPunct="1">
+      <a:lvl7pPr marL="668557" indent="-278566" algn="l" defTabSz="2674224" rtl="0" eaLnBrk="1" latinLnBrk="0" hangingPunct="1">
         <a:lnSpc>
           <a:spcPct val="100000"/>
         </a:lnSpc>
         <a:spcBef>
-          <a:spcPts val="780"/>
+          <a:spcPts val="731"/>
         </a:spcBef>
         <a:buClr>
           <a:schemeClr val="bg1">
@@ -4577,7 +4577,7 @@
         </a:buClr>
         <a:buFont typeface="Arial" panose="020B0604020202020204" pitchFamily="34" charset="0"/>
         <a:buChar char="•"/>
-        <a:defRPr sz="1558" kern="1200">
+        <a:defRPr sz="1461" kern="1200">
           <a:solidFill>
             <a:schemeClr val="tx1"/>
           </a:solidFill>
@@ -4586,12 +4586,12 @@
           <a:cs typeface="+mn-cs"/>
         </a:defRPr>
       </a:lvl7pPr>
-      <a:lvl8pPr marL="712813" indent="-297006" algn="l" defTabSz="2851248" rtl="0" eaLnBrk="1" latinLnBrk="0" hangingPunct="1">
+      <a:lvl8pPr marL="668557" indent="-278566" algn="l" defTabSz="2674224" rtl="0" eaLnBrk="1" latinLnBrk="0" hangingPunct="1">
         <a:lnSpc>
           <a:spcPct val="100000"/>
         </a:lnSpc>
         <a:spcBef>
-          <a:spcPts val="780"/>
+          <a:spcPts val="731"/>
         </a:spcBef>
         <a:buClr>
           <a:schemeClr val="bg1">
@@ -4600,7 +4600,7 @@
         </a:buClr>
         <a:buFont typeface="Arial" panose="020B0604020202020204" pitchFamily="34" charset="0"/>
         <a:buChar char="•"/>
-        <a:defRPr sz="1558" kern="1200">
+        <a:defRPr sz="1461" kern="1200">
           <a:solidFill>
             <a:schemeClr val="tx1"/>
           </a:solidFill>
@@ -4609,12 +4609,12 @@
           <a:cs typeface="+mn-cs"/>
         </a:defRPr>
       </a:lvl8pPr>
-      <a:lvl9pPr marL="712813" indent="-297006" algn="l" defTabSz="2851248" rtl="0" eaLnBrk="1" latinLnBrk="0" hangingPunct="1">
+      <a:lvl9pPr marL="668557" indent="-278566" algn="l" defTabSz="2674224" rtl="0" eaLnBrk="1" latinLnBrk="0" hangingPunct="1">
         <a:lnSpc>
           <a:spcPct val="100000"/>
         </a:lnSpc>
         <a:spcBef>
-          <a:spcPts val="780"/>
+          <a:spcPts val="731"/>
         </a:spcBef>
         <a:buClr>
           <a:schemeClr val="bg1">
@@ -4623,7 +4623,7 @@
         </a:buClr>
         <a:buFont typeface="Arial" panose="020B0604020202020204" pitchFamily="34" charset="0"/>
         <a:buChar char="•"/>
-        <a:defRPr sz="1558" kern="1200">
+        <a:defRPr sz="1461" kern="1200">
           <a:solidFill>
             <a:schemeClr val="tx1"/>
           </a:solidFill>
@@ -4637,8 +4637,8 @@
       <a:defPPr>
         <a:defRPr lang="en-US"/>
       </a:defPPr>
-      <a:lvl1pPr marL="0" algn="l" defTabSz="2851248" rtl="0" eaLnBrk="1" latinLnBrk="0" hangingPunct="1">
-        <a:defRPr sz="5612" kern="1200">
+      <a:lvl1pPr marL="0" algn="l" defTabSz="2674224" rtl="0" eaLnBrk="1" latinLnBrk="0" hangingPunct="1">
+        <a:defRPr sz="5265" kern="1200">
           <a:solidFill>
             <a:schemeClr val="tx1"/>
           </a:solidFill>
@@ -4647,8 +4647,8 @@
           <a:cs typeface="+mn-cs"/>
         </a:defRPr>
       </a:lvl1pPr>
-      <a:lvl2pPr marL="1425625" algn="l" defTabSz="2851248" rtl="0" eaLnBrk="1" latinLnBrk="0" hangingPunct="1">
-        <a:defRPr sz="5612" kern="1200">
+      <a:lvl2pPr marL="1337113" algn="l" defTabSz="2674224" rtl="0" eaLnBrk="1" latinLnBrk="0" hangingPunct="1">
+        <a:defRPr sz="5265" kern="1200">
           <a:solidFill>
             <a:schemeClr val="tx1"/>
           </a:solidFill>
@@ -4657,8 +4657,8 @@
           <a:cs typeface="+mn-cs"/>
         </a:defRPr>
       </a:lvl2pPr>
-      <a:lvl3pPr marL="2851248" algn="l" defTabSz="2851248" rtl="0" eaLnBrk="1" latinLnBrk="0" hangingPunct="1">
-        <a:defRPr sz="5612" kern="1200">
+      <a:lvl3pPr marL="2674224" algn="l" defTabSz="2674224" rtl="0" eaLnBrk="1" latinLnBrk="0" hangingPunct="1">
+        <a:defRPr sz="5265" kern="1200">
           <a:solidFill>
             <a:schemeClr val="tx1"/>
           </a:solidFill>
@@ -4667,8 +4667,8 @@
           <a:cs typeface="+mn-cs"/>
         </a:defRPr>
       </a:lvl3pPr>
-      <a:lvl4pPr marL="4276873" algn="l" defTabSz="2851248" rtl="0" eaLnBrk="1" latinLnBrk="0" hangingPunct="1">
-        <a:defRPr sz="5612" kern="1200">
+      <a:lvl4pPr marL="4011337" algn="l" defTabSz="2674224" rtl="0" eaLnBrk="1" latinLnBrk="0" hangingPunct="1">
+        <a:defRPr sz="5265" kern="1200">
           <a:solidFill>
             <a:schemeClr val="tx1"/>
           </a:solidFill>
@@ -4677,8 +4677,8 @@
           <a:cs typeface="+mn-cs"/>
         </a:defRPr>
       </a:lvl4pPr>
-      <a:lvl5pPr marL="5702498" algn="l" defTabSz="2851248" rtl="0" eaLnBrk="1" latinLnBrk="0" hangingPunct="1">
-        <a:defRPr sz="5612" kern="1200">
+      <a:lvl5pPr marL="5348451" algn="l" defTabSz="2674224" rtl="0" eaLnBrk="1" latinLnBrk="0" hangingPunct="1">
+        <a:defRPr sz="5265" kern="1200">
           <a:solidFill>
             <a:schemeClr val="tx1"/>
           </a:solidFill>
@@ -4687,8 +4687,8 @@
           <a:cs typeface="+mn-cs"/>
         </a:defRPr>
       </a:lvl5pPr>
-      <a:lvl6pPr marL="7128121" algn="l" defTabSz="2851248" rtl="0" eaLnBrk="1" latinLnBrk="0" hangingPunct="1">
-        <a:defRPr sz="5612" kern="1200">
+      <a:lvl6pPr marL="6685561" algn="l" defTabSz="2674224" rtl="0" eaLnBrk="1" latinLnBrk="0" hangingPunct="1">
+        <a:defRPr sz="5265" kern="1200">
           <a:solidFill>
             <a:schemeClr val="tx1"/>
           </a:solidFill>
@@ -4697,8 +4697,8 @@
           <a:cs typeface="+mn-cs"/>
         </a:defRPr>
       </a:lvl6pPr>
-      <a:lvl7pPr marL="8553746" algn="l" defTabSz="2851248" rtl="0" eaLnBrk="1" latinLnBrk="0" hangingPunct="1">
-        <a:defRPr sz="5612" kern="1200">
+      <a:lvl7pPr marL="8022675" algn="l" defTabSz="2674224" rtl="0" eaLnBrk="1" latinLnBrk="0" hangingPunct="1">
+        <a:defRPr sz="5265" kern="1200">
           <a:solidFill>
             <a:schemeClr val="tx1"/>
           </a:solidFill>
@@ -4707,8 +4707,8 @@
           <a:cs typeface="+mn-cs"/>
         </a:defRPr>
       </a:lvl7pPr>
-      <a:lvl8pPr marL="9979370" algn="l" defTabSz="2851248" rtl="0" eaLnBrk="1" latinLnBrk="0" hangingPunct="1">
-        <a:defRPr sz="5612" kern="1200">
+      <a:lvl8pPr marL="9359786" algn="l" defTabSz="2674224" rtl="0" eaLnBrk="1" latinLnBrk="0" hangingPunct="1">
+        <a:defRPr sz="5265" kern="1200">
           <a:solidFill>
             <a:schemeClr val="tx1"/>
           </a:solidFill>
@@ -4717,8 +4717,8 @@
           <a:cs typeface="+mn-cs"/>
         </a:defRPr>
       </a:lvl8pPr>
-      <a:lvl9pPr marL="11404994" algn="l" defTabSz="2851248" rtl="0" eaLnBrk="1" latinLnBrk="0" hangingPunct="1">
-        <a:defRPr sz="5612" kern="1200">
+      <a:lvl9pPr marL="10696898" algn="l" defTabSz="2674224" rtl="0" eaLnBrk="1" latinLnBrk="0" hangingPunct="1">
+        <a:defRPr sz="5265" kern="1200">
           <a:solidFill>
             <a:schemeClr val="tx1"/>
           </a:solidFill>
@@ -4732,22 +4732,22 @@
   <p:extLst mod="1">
     <p:ext uri="{27BBF7A9-308A-43DC-89C8-2F10F3537804}">
       <p15:sldGuideLst xmlns:p15="http://schemas.microsoft.com/office/powerpoint/2012/main">
-        <p15:guide id="1" orient="horz" pos="6736" userDrawn="1">
+        <p15:guide id="1" orient="horz" pos="8550" userDrawn="1">
           <p15:clr>
             <a:srgbClr val="A4A3A4"/>
           </p15:clr>
         </p15:guide>
-        <p15:guide id="2" pos="497" userDrawn="1">
+        <p15:guide id="2" pos="532" userDrawn="1">
           <p15:clr>
             <a:srgbClr val="A4A3A4"/>
           </p15:clr>
         </p15:guide>
-        <p15:guide id="3" pos="18574" userDrawn="1">
+        <p15:guide id="3" pos="19900" userDrawn="1">
           <p15:clr>
             <a:srgbClr val="A4A3A4"/>
           </p15:clr>
         </p15:guide>
-        <p15:guide id="4" pos="9536" userDrawn="1">
+        <p15:guide id="4" pos="10217" userDrawn="1">
           <p15:clr>
             <a:srgbClr val="A4A3A4"/>
           </p15:clr>
@@ -4795,19 +4795,19 @@
         </p:nvSpPr>
         <p:spPr>
           <a:xfrm>
-            <a:off x="1294821" y="-223876"/>
-            <a:ext cx="24014465" cy="1168169"/>
+            <a:off x="328187" y="165764"/>
+            <a:ext cx="19519600" cy="1185635"/>
           </a:xfrm>
         </p:spPr>
         <p:txBody>
           <a:bodyPr>
-            <a:normAutofit/>
+            <a:normAutofit fontScale="90000"/>
           </a:bodyPr>
           <a:lstStyle/>
           <a:p>
             <a:r>
-              <a:rPr lang="pt-BR" sz="4400" dirty="0"/>
-              <a:t>MODELAGEM E SIMULACAO DO MUNDO FISICO PROJETO 2</a:t>
+              <a:rPr lang="pt-BR" dirty="0"/>
+              <a:t>MODELAGEM E SIMULAÇÃO DO MUNDO FISICO</a:t>
             </a:r>
           </a:p>
         </p:txBody>
@@ -4824,8 +4824,8 @@
         </p:nvSpPr>
         <p:spPr>
           <a:xfrm>
-            <a:off x="1294821" y="2512705"/>
-            <a:ext cx="28980392" cy="704941"/>
+            <a:off x="855955" y="3375660"/>
+            <a:ext cx="22299030" cy="532936"/>
           </a:xfrm>
         </p:spPr>
         <p:txBody>
@@ -4833,13 +4833,22 @@
           <a:lstStyle/>
           <a:p>
             <a:r>
-              <a:rPr lang="pt-BR" sz="6000" dirty="0">
-                <a:solidFill>
-                  <a:schemeClr val="bg1"/>
-                </a:solidFill>
-              </a:rPr>
-              <a:t>Antonio Andraues    |   Joao Gabriel                                                            |       1”B</a:t>
-            </a:r>
+              <a:rPr lang="pt-BR" sz="3600" dirty="0"/>
+              <a:t>Antônio </a:t>
+            </a:r>
+            <a:r>
+              <a:rPr lang="pt-BR" sz="3600" dirty="0" err="1"/>
+              <a:t>Andraues</a:t>
+            </a:r>
+            <a:r>
+              <a:rPr lang="pt-BR" sz="3600" dirty="0"/>
+              <a:t>    |   João Gabriel       </a:t>
+            </a:r>
+            <a:r>
+              <a:rPr lang="pt-BR" sz="4000" dirty="0"/>
+              <a:t>|       1”B</a:t>
+            </a:r>
+            <a:endParaRPr lang="pt-BR" dirty="0"/>
           </a:p>
         </p:txBody>
       </p:sp>
@@ -4855,8 +4864,8 @@
         </p:nvSpPr>
         <p:spPr>
           <a:xfrm>
-            <a:off x="184262" y="3430541"/>
-            <a:ext cx="8024438" cy="831584"/>
+            <a:off x="753344" y="4679017"/>
+            <a:ext cx="8290165" cy="1055562"/>
           </a:xfrm>
         </p:spPr>
         <p:txBody>
@@ -4864,36 +4873,9 @@
           <a:lstStyle/>
           <a:p>
             <a:r>
-              <a:rPr lang="pt-BR" dirty="0"/>
+              <a:rPr lang="pt-BR"/>
               <a:t>Pergunta</a:t>
             </a:r>
-          </a:p>
-        </p:txBody>
-      </p:sp>
-      <p:sp>
-        <p:nvSpPr>
-          <p:cNvPr id="69" name="Espaço Reservado para Texto 68"/>
-          <p:cNvSpPr>
-            <a:spLocks noGrp="1"/>
-          </p:cNvSpPr>
-          <p:nvPr>
-            <p:ph type="body" sz="quarter" idx="39"/>
-          </p:nvPr>
-        </p:nvSpPr>
-        <p:spPr>
-          <a:xfrm>
-            <a:off x="262837" y="10695914"/>
-            <a:ext cx="8091936" cy="1940944"/>
-          </a:xfrm>
-        </p:spPr>
-        <p:txBody>
-          <a:bodyPr/>
-          <a:lstStyle/>
-          <a:p>
-            <a:pPr algn="just"/>
-            <a:endParaRPr lang="pt-BR" sz="2080" dirty="0"/>
-          </a:p>
-          <a:p>
             <a:endParaRPr lang="pt-BR" dirty="0"/>
           </a:p>
         </p:txBody>
@@ -4910,8 +4892,8 @@
         </p:nvSpPr>
         <p:spPr>
           <a:xfrm>
-            <a:off x="184262" y="7454905"/>
-            <a:ext cx="8010861" cy="831584"/>
+            <a:off x="842163" y="8737306"/>
+            <a:ext cx="8281042" cy="779861"/>
           </a:xfrm>
         </p:spPr>
         <p:txBody>
@@ -4919,9 +4901,10 @@
           <a:lstStyle/>
           <a:p>
             <a:r>
-              <a:rPr lang="pt-BR" dirty="0"/>
+              <a:rPr lang="pt-BR"/>
               <a:t>Introdução</a:t>
             </a:r>
+            <a:endParaRPr lang="pt-BR" dirty="0"/>
           </a:p>
         </p:txBody>
       </p:sp>
@@ -4937,8 +4920,8 @@
         </p:nvSpPr>
         <p:spPr>
           <a:xfrm>
-            <a:off x="0" y="8510287"/>
-            <a:ext cx="8470731" cy="2185627"/>
+            <a:off x="753344" y="10303880"/>
+            <a:ext cx="8281042" cy="2652946"/>
           </a:xfrm>
         </p:spPr>
         <p:txBody>
@@ -4947,34 +4930,22 @@
           </a:bodyPr>
           <a:lstStyle/>
           <a:p>
-            <a:pPr>
-              <a:lnSpc>
-                <a:spcPct val="120000"/>
-              </a:lnSpc>
-            </a:pPr>
-            <a:r>
-              <a:rPr lang="pt-BR" sz="2800" dirty="0"/>
-              <a:t>O uso de anabolizantes está muito difundido nos atletas de alta performance. Com isso pensamos em modelar a administração de um anabólico(</a:t>
-            </a:r>
-            <a:r>
-              <a:rPr lang="en-US" sz="2800" dirty="0" err="1"/>
+            <a:pPr algn="just"/>
+            <a:r>
+              <a:rPr lang="pt-BR" sz="3700" dirty="0"/>
+              <a:t>O uso de anabolizantes está muito difundido nos atletas de alta performance. Com isso pensamos em modelar a administração de um anabólico </a:t>
+            </a:r>
+            <a:r>
+              <a:rPr lang="en-US" sz="3700" dirty="0" err="1"/>
               <a:t>Dianabol</a:t>
             </a:r>
             <a:r>
-              <a:rPr lang="en-US" sz="2800" dirty="0"/>
-              <a:t>(7a-methyl-17b-hydroxy-1,4-androstadien-3-one)</a:t>
-            </a:r>
-            <a:endParaRPr lang="pt-BR" sz="2800" dirty="0"/>
-          </a:p>
-          <a:p>
-            <a:pPr>
-              <a:lnSpc>
-                <a:spcPct val="120000"/>
-              </a:lnSpc>
-            </a:pPr>
-            <a:r>
-              <a:rPr lang="pt-BR" sz="2800" dirty="0"/>
-              <a:t>)  com o principal intuito de informar aos atletas as doses diárias e a sua acumulação.</a:t>
+              <a:rPr lang="en-US" sz="3700" dirty="0"/>
+              <a:t> (7a-methyl-17b-hydroxy-1,4-androstadien-3-one)</a:t>
+            </a:r>
+            <a:r>
+              <a:rPr lang="pt-BR" sz="3700" dirty="0"/>
+              <a:t> com o principal intuito de informar aos atletas as doses diárias e a sua acumulação em função da toxicidade.</a:t>
             </a:r>
           </a:p>
           <a:p>
@@ -4994,8 +4965,8 @@
         </p:nvSpPr>
         <p:spPr>
           <a:xfrm>
-            <a:off x="226573" y="12413620"/>
-            <a:ext cx="8024438" cy="993026"/>
+            <a:off x="732576" y="13343822"/>
+            <a:ext cx="8281042" cy="742726"/>
           </a:xfrm>
         </p:spPr>
         <p:txBody>
@@ -5021,51 +4992,72 @@
         </p:nvSpPr>
         <p:spPr>
           <a:xfrm>
-            <a:off x="43793" y="13779434"/>
-            <a:ext cx="8830270" cy="3915408"/>
+            <a:off x="836715" y="14873981"/>
+            <a:ext cx="8281042" cy="4484269"/>
           </a:xfrm>
         </p:spPr>
         <p:txBody>
-          <a:bodyPr/>
+          <a:bodyPr>
+            <a:normAutofit fontScale="85000" lnSpcReduction="20000"/>
+          </a:bodyPr>
           <a:lstStyle/>
           <a:p>
-            <a:r>
-              <a:rPr lang="pt-BR" dirty="0"/>
+            <a:pPr algn="just"/>
+            <a:r>
+              <a:rPr lang="pt-BR" sz="3100" dirty="0"/>
               <a:t>Para o começo desse projeto você deve ter em mente alguns fatores:</a:t>
             </a:r>
           </a:p>
           <a:p>
-            <a:r>
-              <a:rPr lang="pt-BR" dirty="0"/>
-              <a:t>Bridge</a:t>
-            </a:r>
-            <a:r>
-              <a:rPr lang="pt-BR" dirty="0">
+            <a:pPr algn="just"/>
+            <a:r>
+              <a:rPr lang="pt-BR" sz="3100" dirty="0">
                 <a:sym typeface="Wingdings" panose="05000000000000000000" pitchFamily="2" charset="2"/>
               </a:rPr>
-              <a:t> Nome dado a ponte entre anabolizantes; Intuito de manter um bom nível de testosterona sem comprometer o nível toxico.</a:t>
-            </a:r>
-          </a:p>
-          <a:p>
-            <a:r>
-              <a:rPr lang="pt-BR" dirty="0">
-                <a:sym typeface="Wingdings" panose="05000000000000000000" pitchFamily="2" charset="2"/>
-              </a:rPr>
-              <a:t>Janela terapêutica Ambos anabolizantes são </a:t>
-            </a:r>
-            <a:r>
-              <a:rPr lang="pt-BR" dirty="0" err="1">
+              <a:t>Janela terapêutica Todos os anabolizantes são </a:t>
+            </a:r>
+            <a:r>
+              <a:rPr lang="pt-BR" sz="3100" dirty="0" err="1">
                 <a:sym typeface="Wingdings" panose="05000000000000000000" pitchFamily="2" charset="2"/>
               </a:rPr>
               <a:t>Hepatotóxicos</a:t>
             </a:r>
             <a:r>
-              <a:rPr lang="pt-BR" dirty="0">
+              <a:rPr lang="pt-BR" sz="3100" dirty="0">
                 <a:sym typeface="Wingdings" panose="05000000000000000000" pitchFamily="2" charset="2"/>
               </a:rPr>
-              <a:t>, portanto para nossa abstração consideramos que a faixa ideal do uso oscila entre 25mg100mg da concentração no sangue.</a:t>
-            </a:r>
-            <a:endParaRPr lang="pt-BR" dirty="0"/>
+              <a:t>, portanto para nossa simulação consideramos que a faixa ideal do uso oscila entre 25mg100mg da concentração de anabolizante no sangue.</a:t>
+            </a:r>
+          </a:p>
+          <a:p>
+            <a:pPr algn="just"/>
+            <a:r>
+              <a:rPr lang="pt-BR" sz="3100" dirty="0" err="1">
+                <a:sym typeface="Wingdings" panose="05000000000000000000" pitchFamily="2" charset="2"/>
+              </a:rPr>
+              <a:t>Bio</a:t>
+            </a:r>
+            <a:r>
+              <a:rPr lang="pt-BR" sz="3100" dirty="0">
+                <a:sym typeface="Wingdings" panose="05000000000000000000" pitchFamily="2" charset="2"/>
+              </a:rPr>
+              <a:t> acumulação: Substancias como anabolizantes em geral possuem meia vida muito alta (variam de acordo com o tipo de administração, como oral de 6~8 horas e venal 48~72 horas), portanto há uma grande chance de acumular a substancia no corpo.</a:t>
+            </a:r>
+          </a:p>
+          <a:p>
+            <a:endParaRPr lang="pt-BR" dirty="0">
+              <a:sym typeface="Wingdings" panose="05000000000000000000" pitchFamily="2" charset="2"/>
+            </a:endParaRPr>
+          </a:p>
+          <a:p>
+            <a:endParaRPr lang="pt-BR" dirty="0">
+              <a:sym typeface="Wingdings" panose="05000000000000000000" pitchFamily="2" charset="2"/>
+            </a:endParaRPr>
+          </a:p>
+          <a:p>
+            <a:endParaRPr lang="pt-BR" dirty="0">
+              <a:sym typeface="Wingdings" panose="05000000000000000000" pitchFamily="2" charset="2"/>
+            </a:endParaRPr>
           </a:p>
         </p:txBody>
       </p:sp>
@@ -5081,8 +5073,8 @@
         </p:nvSpPr>
         <p:spPr>
           <a:xfrm>
-            <a:off x="184262" y="17024446"/>
-            <a:ext cx="8109060" cy="778848"/>
+            <a:off x="732576" y="20252527"/>
+            <a:ext cx="8198826" cy="1005299"/>
           </a:xfrm>
         </p:spPr>
         <p:txBody>
@@ -5090,9 +5082,10 @@
           <a:lstStyle/>
           <a:p>
             <a:r>
-              <a:rPr lang="pt-BR" dirty="0"/>
+              <a:rPr lang="pt-BR"/>
               <a:t>Abstrações</a:t>
             </a:r>
+            <a:endParaRPr lang="pt-BR" dirty="0"/>
           </a:p>
         </p:txBody>
       </p:sp>
@@ -5108,68 +5101,51 @@
         </p:nvSpPr>
         <p:spPr>
           <a:xfrm>
-            <a:off x="43793" y="18176082"/>
-            <a:ext cx="8830270" cy="4740037"/>
+            <a:off x="762467" y="21722259"/>
+            <a:ext cx="8198826" cy="3193667"/>
           </a:xfrm>
         </p:spPr>
         <p:txBody>
-          <a:bodyPr/>
+          <a:bodyPr>
+            <a:normAutofit fontScale="92500" lnSpcReduction="10000"/>
+          </a:bodyPr>
           <a:lstStyle/>
           <a:p>
-            <a:pPr marL="334130" indent="-334130">
-              <a:buFont typeface="+mj-lt"/>
-              <a:buAutoNum type="arabicPeriod"/>
-            </a:pPr>
-            <a:r>
-              <a:rPr lang="pt-BR" dirty="0"/>
-              <a:t>Administração via oral</a:t>
-            </a:r>
-          </a:p>
-          <a:p>
-            <a:pPr marL="334130" indent="-334130">
-              <a:buFont typeface="+mj-lt"/>
-              <a:buAutoNum type="arabicPeriod"/>
-            </a:pPr>
-            <a:r>
-              <a:rPr lang="pt-BR" dirty="0"/>
-              <a:t> Indicado para homens que pesam entre 70 a 90kg.</a:t>
-            </a:r>
-          </a:p>
-          <a:p>
-            <a:pPr marL="334130" indent="-334130">
-              <a:buFont typeface="+mj-lt"/>
-              <a:buAutoNum type="arabicPeriod"/>
-            </a:pPr>
-            <a:r>
-              <a:rPr lang="pt-BR" dirty="0"/>
-              <a:t>Consideramos que o atleta moldado e saudável e não possui nenhuma doença hepática.</a:t>
-            </a:r>
-          </a:p>
-          <a:p>
-            <a:pPr marL="334130" indent="-334130">
-              <a:buFont typeface="+mj-lt"/>
-              <a:buAutoNum type="arabicPeriod"/>
-            </a:pPr>
-            <a:r>
-              <a:rPr lang="pt-BR" dirty="0"/>
-              <a:t>O estoque Estomago representa o sistema digestório inteiro</a:t>
-            </a:r>
-          </a:p>
-          <a:p>
-            <a:pPr marL="334130" indent="-334130">
-              <a:buFont typeface="+mj-lt"/>
-              <a:buAutoNum type="arabicPeriod"/>
-            </a:pPr>
-            <a:r>
-              <a:rPr lang="pt-BR" dirty="0"/>
-              <a:t>Doses constantes</a:t>
-            </a:r>
-          </a:p>
-          <a:p>
-            <a:pPr marL="334130" indent="-334130">
-              <a:buFont typeface="+mj-lt"/>
-              <a:buAutoNum type="arabicPeriod"/>
-            </a:pPr>
+            <a:pPr algn="just"/>
+            <a:r>
+              <a:rPr lang="pt-BR" sz="2800" dirty="0"/>
+              <a:t>Administração via oral apenas;</a:t>
+            </a:r>
+          </a:p>
+          <a:p>
+            <a:pPr algn="just"/>
+            <a:r>
+              <a:rPr lang="pt-BR" sz="2800" dirty="0"/>
+              <a:t> Indicado para homens que pesam entre 70 a 90kg;</a:t>
+            </a:r>
+          </a:p>
+          <a:p>
+            <a:pPr algn="just"/>
+            <a:r>
+              <a:rPr lang="pt-BR" sz="2800" dirty="0"/>
+              <a:t>Consideramos que o atleta no modelo é saudável e não possui nenhuma doença hepática;</a:t>
+            </a:r>
+          </a:p>
+          <a:p>
+            <a:pPr algn="just"/>
+            <a:r>
+              <a:rPr lang="pt-BR" sz="2800" dirty="0"/>
+              <a:t>O estoque Estomago representa o sistema digestório inteiro;</a:t>
+            </a:r>
+          </a:p>
+          <a:p>
+            <a:pPr algn="just"/>
+            <a:r>
+              <a:rPr lang="pt-BR" sz="2800" dirty="0"/>
+              <a:t>Doses constantes;</a:t>
+            </a:r>
+          </a:p>
+          <a:p>
             <a:endParaRPr lang="pt-BR" dirty="0"/>
           </a:p>
         </p:txBody>
@@ -5186,8 +5162,8 @@
         </p:nvSpPr>
         <p:spPr>
           <a:xfrm>
-            <a:off x="9971594" y="3749279"/>
-            <a:ext cx="8830270" cy="791986"/>
+            <a:off x="11389584" y="4690541"/>
+            <a:ext cx="8281042" cy="990707"/>
           </a:xfrm>
         </p:spPr>
         <p:txBody>
@@ -5213,8 +5189,8 @@
         </p:nvSpPr>
         <p:spPr>
           <a:xfrm>
-            <a:off x="9943846" y="9567293"/>
-            <a:ext cx="8830270" cy="791986"/>
+            <a:off x="11389584" y="10499868"/>
+            <a:ext cx="8281042" cy="871038"/>
           </a:xfrm>
         </p:spPr>
         <p:txBody>
@@ -5224,6 +5200,44 @@
             <a:r>
               <a:rPr lang="pt-BR" dirty="0"/>
               <a:t>Equações diferencias </a:t>
+            </a:r>
+          </a:p>
+        </p:txBody>
+      </p:sp>
+      <p:sp>
+        <p:nvSpPr>
+          <p:cNvPr id="101" name="Espaço Reservado para Conteúdo 10"/>
+          <p:cNvSpPr>
+            <a:spLocks noGrp="1"/>
+          </p:cNvSpPr>
+          <p:nvPr>
+            <p:ph sz="quarter" idx="23"/>
+          </p:nvPr>
+        </p:nvSpPr>
+        <p:spPr>
+          <a:xfrm>
+            <a:off x="855955" y="6119213"/>
+            <a:ext cx="8281042" cy="1979375"/>
+          </a:xfrm>
+        </p:spPr>
+        <p:txBody>
+          <a:bodyPr>
+            <a:normAutofit/>
+          </a:bodyPr>
+          <a:lstStyle/>
+          <a:p>
+            <a:pPr algn="just"/>
+            <a:r>
+              <a:rPr lang="pt-BR" sz="2800" dirty="0"/>
+              <a:t>Para diferentes dose iniciais de </a:t>
+            </a:r>
+            <a:r>
+              <a:rPr lang="pt-BR" sz="2800" dirty="0" err="1"/>
+              <a:t>Dianabol</a:t>
+            </a:r>
+            <a:r>
+              <a:rPr lang="pt-BR" sz="2800" dirty="0"/>
+              <a:t> no primeiro ciclo, qual deve ser a administração do fármaco para um ganho que obedeça a janela terapêutica ?</a:t>
             </a:r>
           </a:p>
         </p:txBody>
@@ -5240,8 +5254,8 @@
         </p:nvSpPr>
         <p:spPr>
           <a:xfrm>
-            <a:off x="9943846" y="15410656"/>
-            <a:ext cx="8830270" cy="791986"/>
+            <a:off x="11389584" y="17412645"/>
+            <a:ext cx="8281042" cy="880735"/>
           </a:xfrm>
         </p:spPr>
         <p:txBody>
@@ -5251,33 +5265,6 @@
             <a:r>
               <a:rPr lang="pt-BR" dirty="0"/>
               <a:t>Efeito da 1.ª dose </a:t>
-            </a:r>
-          </a:p>
-        </p:txBody>
-      </p:sp>
-      <p:sp>
-        <p:nvSpPr>
-          <p:cNvPr id="17" name="Espaço Reservado para Conteúdo 16"/>
-          <p:cNvSpPr>
-            <a:spLocks noGrp="1"/>
-          </p:cNvSpPr>
-          <p:nvPr>
-            <p:ph sz="quarter" idx="30"/>
-          </p:nvPr>
-        </p:nvSpPr>
-        <p:spPr>
-          <a:xfrm>
-            <a:off x="10099328" y="16708927"/>
-            <a:ext cx="8702535" cy="2766011"/>
-          </a:xfrm>
-        </p:spPr>
-        <p:txBody>
-          <a:bodyPr/>
-          <a:lstStyle/>
-          <a:p>
-            <a:r>
-              <a:rPr lang="pt-BR" dirty="0"/>
-              <a:t> </a:t>
             </a:r>
           </a:p>
         </p:txBody>
@@ -5299,12 +5286,41 @@
           <a:p>
             <a:r>
               <a:rPr lang="pt-BR"/>
-              <a:t>Resultados</a:t>
+              <a:t>Experimento com 10 mg e 41 mg</a:t>
             </a:r>
             <a:endParaRPr lang="pt-BR" dirty="0"/>
           </a:p>
         </p:txBody>
       </p:sp>
+      <p:pic>
+        <p:nvPicPr>
+          <p:cNvPr id="110" name="Espaço Reservado para Conteúdo 109"/>
+          <p:cNvPicPr>
+            <a:picLocks noGrp="1" noChangeAspect="1"/>
+          </p:cNvPicPr>
+          <p:nvPr>
+            <p:ph sz="quarter" idx="32"/>
+          </p:nvPr>
+        </p:nvPicPr>
+        <p:blipFill>
+          <a:blip r:embed="rId3">
+            <a:extLst>
+              <a:ext uri="{28A0092B-C50C-407E-A947-70E740481C1C}">
+                <a14:useLocalDpi xmlns:a14="http://schemas.microsoft.com/office/drawing/2010/main" val="0"/>
+              </a:ext>
+            </a:extLst>
+          </a:blip>
+          <a:stretch>
+            <a:fillRect/>
+          </a:stretch>
+        </p:blipFill>
+        <p:spPr>
+          <a:xfrm>
+            <a:off x="22365570" y="6178152"/>
+            <a:ext cx="6137526" cy="3966610"/>
+          </a:xfrm>
+        </p:spPr>
+      </p:pic>
       <p:sp>
         <p:nvSpPr>
           <p:cNvPr id="71" name="Espaço Reservado para Texto 70"/>
@@ -5317,8 +5333,8 @@
         </p:nvSpPr>
         <p:spPr>
           <a:xfrm>
-            <a:off x="20563089" y="13860906"/>
-            <a:ext cx="8830270" cy="791986"/>
+            <a:off x="21531603" y="15111971"/>
+            <a:ext cx="9460441" cy="1005299"/>
           </a:xfrm>
         </p:spPr>
         <p:txBody>
@@ -5326,9 +5342,10 @@
           <a:lstStyle/>
           <a:p>
             <a:r>
-              <a:rPr lang="pt-BR" dirty="0"/>
+              <a:rPr lang="pt-BR"/>
               <a:t>Conclusão</a:t>
             </a:r>
+            <a:endParaRPr lang="pt-BR" dirty="0"/>
           </a:p>
         </p:txBody>
       </p:sp>
@@ -5344,32 +5361,37 @@
         </p:nvSpPr>
         <p:spPr>
           <a:xfrm>
-            <a:off x="20249833" y="14791466"/>
-            <a:ext cx="8315855" cy="2822351"/>
+            <a:off x="21551285" y="16387668"/>
+            <a:ext cx="9460441" cy="3582521"/>
           </a:xfrm>
         </p:spPr>
         <p:txBody>
-          <a:bodyPr/>
+          <a:bodyPr>
+            <a:noAutofit/>
+          </a:bodyPr>
           <a:lstStyle/>
           <a:p>
             <a:r>
-              <a:rPr lang="pt-BR" dirty="0"/>
-              <a:t>Para doses </a:t>
-            </a:r>
-            <a:r>
-              <a:rPr lang="pt-BR" dirty="0" err="1"/>
-              <a:t>abaixos</a:t>
-            </a:r>
-            <a:r>
-              <a:rPr lang="pt-BR" dirty="0"/>
-              <a:t> de 10 mg/dia </a:t>
-            </a:r>
-          </a:p>
-          <a:p>
-            <a:r>
-              <a:rPr lang="pt-BR" dirty="0"/>
-              <a:t>Indique e explique se os dados sustentam sua hipótese</a:t>
-            </a:r>
+              <a:rPr lang="pt-BR" sz="2600" dirty="0"/>
+              <a:t>Para doses abaixo de 10 mg/dia não há ganhos significativos assim como acima de 41 mg/dia há grandes chances de </a:t>
+            </a:r>
+          </a:p>
+          <a:p>
+            <a:r>
+              <a:rPr lang="pt-BR" sz="2600" dirty="0"/>
+              <a:t>O modelo possui a seguinte limitação: A literatura indica a divisão de doses ao longo do dia dependendo da concentração, porém o modelo considera uma dose única ao longo do dia, portanto o gráfico muda, apresentando outros resultados.</a:t>
+            </a:r>
+          </a:p>
+          <a:p>
+            <a:r>
+              <a:rPr lang="pt-BR" sz="2600" dirty="0"/>
+              <a:t>Por final, ao procurar na literatura, pode-se achar o gráfico com um comportamento similar ao do modelo, validando assim </a:t>
+            </a:r>
+            <a:r>
+              <a:rPr lang="pt-BR" sz="2600"/>
+              <a:t>a hipótese:</a:t>
+            </a:r>
+            <a:endParaRPr lang="pt-BR" sz="2600" dirty="0"/>
           </a:p>
         </p:txBody>
       </p:sp>
@@ -5385,8 +5407,8 @@
         </p:nvSpPr>
         <p:spPr>
           <a:xfrm>
-            <a:off x="20563089" y="18682952"/>
-            <a:ext cx="8830270" cy="791986"/>
+            <a:off x="21993987" y="24413276"/>
+            <a:ext cx="9460441" cy="1005299"/>
           </a:xfrm>
         </p:spPr>
         <p:txBody>
@@ -5412,8 +5434,8 @@
         </p:nvSpPr>
         <p:spPr>
           <a:xfrm>
-            <a:off x="20563089" y="19817195"/>
-            <a:ext cx="8830270" cy="2898669"/>
+            <a:off x="21993988" y="25476146"/>
+            <a:ext cx="9460441" cy="1207656"/>
           </a:xfrm>
         </p:spPr>
         <p:txBody>
@@ -5421,14 +5443,14 @@
           <a:lstStyle/>
           <a:p>
             <a:r>
-              <a:rPr lang="pt-BR" dirty="0"/>
+              <a:rPr lang="pt-BR"/>
               <a:t>Todos os links no GitHub.</a:t>
             </a:r>
           </a:p>
           <a:p>
             <a:r>
-              <a:rPr lang="pt-BR" dirty="0">
-                <a:hlinkClick r:id="rId3" action="ppaction://hlinkfile"/>
+              <a:rPr lang="pt-BR">
+                <a:hlinkClick r:id="rId4" action="ppaction://hlinkfile"/>
               </a:rPr>
               <a:t>https://github.com/AntonioAndraues/ProjetoModSim/blob/master/Links</a:t>
             </a:r>
@@ -5447,24 +5469,19 @@
           </p:nvPr>
         </p:nvPicPr>
         <p:blipFill>
-          <a:blip r:embed="rId4">
+          <a:blip r:embed="rId5">
             <a:extLst>
               <a:ext uri="{28A0092B-C50C-407E-A947-70E740481C1C}">
                 <a14:useLocalDpi xmlns:a14="http://schemas.microsoft.com/office/drawing/2010/main" val="0"/>
               </a:ext>
             </a:extLst>
           </a:blip>
-          <a:srcRect t="37982" b="37982"/>
+          <a:srcRect t="38682" b="38682"/>
           <a:stretch>
             <a:fillRect/>
           </a:stretch>
         </p:blipFill>
-        <p:spPr>
-          <a:xfrm>
-            <a:off x="21844741" y="-9491658"/>
-            <a:ext cx="7548618" cy="4711887"/>
-          </a:xfrm>
-        </p:spPr>
+        <p:spPr/>
       </p:pic>
       <p:cxnSp>
         <p:nvCxnSpPr>
@@ -5476,8 +5493,8 @@
         </p:nvCxnSpPr>
         <p:spPr>
           <a:xfrm>
-            <a:off x="9196325" y="3217646"/>
-            <a:ext cx="0" cy="18165979"/>
+            <a:off x="10152759" y="4428686"/>
+            <a:ext cx="0" cy="22487499"/>
           </a:xfrm>
           <a:prstGeom prst="line">
             <a:avLst/>
@@ -5509,8 +5526,8 @@
         </p:nvCxnSpPr>
         <p:spPr>
           <a:xfrm>
-            <a:off x="19899395" y="3217646"/>
-            <a:ext cx="0" cy="18165979"/>
+            <a:off x="21293114" y="4404242"/>
+            <a:ext cx="280671" cy="22511943"/>
           </a:xfrm>
           <a:prstGeom prst="line">
             <a:avLst/>
@@ -5542,15 +5559,15 @@
         </p:nvSpPr>
         <p:spPr bwMode="auto">
           <a:xfrm>
-            <a:off x="1604347" y="1273051"/>
-            <a:ext cx="21826436" cy="841273"/>
+            <a:off x="479254" y="1696444"/>
+            <a:ext cx="20468868" cy="788947"/>
           </a:xfrm>
           <a:prstGeom prst="rect">
             <a:avLst/>
           </a:prstGeom>
         </p:spPr>
         <p:txBody>
-          <a:bodyPr vert="horz" lIns="91440" tIns="45720" rIns="91440" bIns="45720" rtlCol="0" anchor="b">
+          <a:bodyPr vert="horz" lIns="85753" tIns="42876" rIns="85753" bIns="42876" rtlCol="0" anchor="b">
             <a:normAutofit/>
           </a:bodyPr>
           <a:lstStyle>
@@ -5574,7 +5591,7 @@
           </a:lstStyle>
           <a:p>
             <a:r>
-              <a:rPr lang="pt-BR" sz="5400" dirty="0"/>
+              <a:rPr lang="pt-BR" sz="5064" dirty="0"/>
               <a:t>Estudo Farmacocinético de Anabolizantes</a:t>
             </a:r>
           </a:p>
@@ -5589,7 +5606,7 @@
           <p:nvPr/>
         </p:nvPicPr>
         <p:blipFill>
-          <a:blip r:embed="rId5">
+          <a:blip r:embed="rId6">
             <a:extLst>
               <a:ext uri="{28A0092B-C50C-407E-A947-70E740481C1C}">
                 <a14:useLocalDpi xmlns:a14="http://schemas.microsoft.com/office/drawing/2010/main" val="0"/>
@@ -5602,64 +5619,14 @@
         </p:blipFill>
         <p:spPr>
           <a:xfrm>
-            <a:off x="9233469" y="4635910"/>
-            <a:ext cx="10703070" cy="4705293"/>
+            <a:off x="11199822" y="6173073"/>
+            <a:ext cx="9301507" cy="4089136"/>
           </a:xfrm>
           <a:prstGeom prst="rect">
             <a:avLst/>
           </a:prstGeom>
         </p:spPr>
       </p:pic>
-      <p:sp>
-        <p:nvSpPr>
-          <p:cNvPr id="101" name="Espaço Reservado para Conteúdo 10"/>
-          <p:cNvSpPr>
-            <a:spLocks noGrp="1"/>
-          </p:cNvSpPr>
-          <p:nvPr>
-            <p:ph sz="quarter" idx="38"/>
-          </p:nvPr>
-        </p:nvSpPr>
-        <p:spPr>
-          <a:xfrm>
-            <a:off x="184263" y="4434903"/>
-            <a:ext cx="8286468" cy="2538761"/>
-          </a:xfrm>
-        </p:spPr>
-        <p:txBody>
-          <a:bodyPr>
-            <a:normAutofit fontScale="92500" lnSpcReduction="20000"/>
-          </a:bodyPr>
-          <a:lstStyle/>
-          <a:p>
-            <a:pPr>
-              <a:lnSpc>
-                <a:spcPct val="120000"/>
-              </a:lnSpc>
-            </a:pPr>
-            <a:r>
-              <a:rPr lang="pt-BR" sz="3200" b="1" spc="300" dirty="0"/>
-              <a:t>Para diferentes dose iniciais de </a:t>
-            </a:r>
-            <a:r>
-              <a:rPr lang="pt-BR" sz="3200" b="1" spc="300" dirty="0" err="1"/>
-              <a:t>Dianabol</a:t>
-            </a:r>
-            <a:r>
-              <a:rPr lang="pt-BR" sz="3200" b="1" spc="300" dirty="0"/>
-              <a:t> no primeiro ciclo, qual deve ser a administração do </a:t>
-            </a:r>
-            <a:r>
-              <a:rPr lang="pt-BR" sz="3200" b="1" spc="300" dirty="0" err="1"/>
-              <a:t>farmaco</a:t>
-            </a:r>
-            <a:r>
-              <a:rPr lang="pt-BR" sz="3200" b="1" spc="300" dirty="0"/>
-              <a:t> para um ganho que obedeça a janela terapêutica ?</a:t>
-            </a:r>
-          </a:p>
-        </p:txBody>
-      </p:sp>
       <mc:AlternateContent xmlns:mc="http://schemas.openxmlformats.org/markup-compatibility/2006">
         <mc:Choice xmlns:a14="http://schemas.microsoft.com/office/drawing/2010/main" Requires="a14">
           <p:sp>
@@ -5670,8 +5637,8 @@
             </p:nvSpPr>
             <p:spPr>
               <a:xfrm>
-                <a:off x="8760692" y="12084577"/>
-                <a:ext cx="10193388" cy="1144159"/>
+                <a:off x="9736169" y="13928755"/>
+                <a:ext cx="9559376" cy="969048"/>
               </a:xfrm>
               <a:prstGeom prst="rect">
                 <a:avLst/>
@@ -5693,20 +5660,20 @@
                       <m:f>
                         <m:fPr>
                           <m:ctrlPr>
-                            <a:rPr lang="pt-BR" sz="3600" i="1" smtClean="0">
+                            <a:rPr lang="pt-BR" sz="3002" i="1">
                               <a:latin typeface="Cambria Math" panose="02040503050406030204" pitchFamily="18" charset="0"/>
                             </a:rPr>
                           </m:ctrlPr>
                         </m:fPr>
                         <m:num>
                           <m:r>
-                            <a:rPr lang="en-US" sz="3600" b="0" i="1" smtClean="0">
+                            <a:rPr lang="en-US" sz="3002" i="1">
                               <a:latin typeface="Cambria Math" panose="02040503050406030204" pitchFamily="18" charset="0"/>
                             </a:rPr>
                             <m:t>𝑑</m:t>
                           </m:r>
                           <m:r>
-                            <a:rPr lang="pt-BR" sz="3600" i="1">
+                            <a:rPr lang="pt-BR" sz="3002" i="1">
                               <a:latin typeface="Cambria Math" panose="02040503050406030204" pitchFamily="18" charset="0"/>
                             </a:rPr>
                             <m:t>𝑠</m:t>
@@ -5717,13 +5684,13 @@
                             <m:rPr>
                               <m:sty m:val="p"/>
                             </m:rPr>
-                            <a:rPr lang="en-US" sz="3600" b="0" i="0" smtClean="0">
+                            <a:rPr lang="en-US" sz="3002">
                               <a:latin typeface="Cambria Math" panose="02040503050406030204" pitchFamily="18" charset="0"/>
                             </a:rPr>
                             <m:t>d</m:t>
                           </m:r>
                           <m:r>
-                            <a:rPr lang="pt-BR" sz="3600" i="1">
+                            <a:rPr lang="pt-BR" sz="3002" i="1">
                               <a:latin typeface="Cambria Math" panose="02040503050406030204" pitchFamily="18" charset="0"/>
                             </a:rPr>
                             <m:t>𝑡</m:t>
@@ -5731,7 +5698,7 @@
                         </m:den>
                       </m:f>
                       <m:r>
-                        <a:rPr lang="pt-BR" sz="3600" i="0">
+                        <a:rPr lang="pt-BR" sz="3002">
                           <a:latin typeface="Cambria Math" panose="02040503050406030204" pitchFamily="18" charset="0"/>
                         </a:rPr>
                         <m:t>=</m:t>
@@ -5739,14 +5706,14 @@
                       <m:sSub>
                         <m:sSubPr>
                           <m:ctrlPr>
-                            <a:rPr lang="en-US" sz="3600" b="0" i="1" smtClean="0">
+                            <a:rPr lang="en-US" sz="3002" i="1">
                               <a:latin typeface="Cambria Math" panose="02040503050406030204" pitchFamily="18" charset="0"/>
                             </a:rPr>
                           </m:ctrlPr>
                         </m:sSubPr>
                         <m:e>
                           <m:r>
-                            <a:rPr lang="pt-BR" sz="3600" i="1">
+                            <a:rPr lang="pt-BR" sz="3002" i="1">
                               <a:latin typeface="Cambria Math" panose="02040503050406030204" pitchFamily="18" charset="0"/>
                             </a:rPr>
                             <m:t>𝐾</m:t>
@@ -5754,7 +5721,7 @@
                         </m:e>
                         <m:sub>
                           <m:r>
-                            <a:rPr lang="pt-BR" sz="3600" i="0">
+                            <a:rPr lang="pt-BR" sz="3002">
                               <a:latin typeface="Cambria Math" panose="02040503050406030204" pitchFamily="18" charset="0"/>
                             </a:rPr>
                             <m:t>2</m:t>
@@ -5762,19 +5729,19 @@
                         </m:sub>
                       </m:sSub>
                       <m:r>
-                        <a:rPr lang="pt-BR" sz="3600" i="0">
+                        <a:rPr lang="pt-BR" sz="3002">
                           <a:latin typeface="Cambria Math" panose="02040503050406030204" pitchFamily="18" charset="0"/>
                         </a:rPr>
                         <m:t>∙</m:t>
                       </m:r>
                       <m:r>
-                        <a:rPr lang="pt-BR" sz="3600" i="1">
+                        <a:rPr lang="pt-BR" sz="3002" i="1">
                           <a:latin typeface="Cambria Math" panose="02040503050406030204" pitchFamily="18" charset="0"/>
                         </a:rPr>
                         <m:t>𝐸</m:t>
                       </m:r>
                       <m:r>
-                        <a:rPr lang="pt-BR" sz="3600" i="0">
+                        <a:rPr lang="pt-BR" sz="3002">
                           <a:latin typeface="Cambria Math" panose="02040503050406030204" pitchFamily="18" charset="0"/>
                         </a:rPr>
                         <m:t>−</m:t>
@@ -5782,14 +5749,14 @@
                       <m:sSub>
                         <m:sSubPr>
                           <m:ctrlPr>
-                            <a:rPr lang="en-US" sz="3600" b="0" i="1" smtClean="0">
+                            <a:rPr lang="en-US" sz="3002" i="1">
                               <a:latin typeface="Cambria Math" panose="02040503050406030204" pitchFamily="18" charset="0"/>
                             </a:rPr>
                           </m:ctrlPr>
                         </m:sSubPr>
                         <m:e>
                           <m:r>
-                            <a:rPr lang="pt-BR" sz="3600" i="1">
+                            <a:rPr lang="pt-BR" sz="3002" i="1">
                               <a:latin typeface="Cambria Math" panose="02040503050406030204" pitchFamily="18" charset="0"/>
                             </a:rPr>
                             <m:t>𝐾</m:t>
@@ -5797,7 +5764,7 @@
                         </m:e>
                         <m:sub>
                           <m:r>
-                            <a:rPr lang="pt-BR" sz="3600" i="0">
+                            <a:rPr lang="pt-BR" sz="3002">
                               <a:latin typeface="Cambria Math" panose="02040503050406030204" pitchFamily="18" charset="0"/>
                             </a:rPr>
                             <m:t>3</m:t>
@@ -5805,19 +5772,19 @@
                         </m:sub>
                       </m:sSub>
                       <m:r>
-                        <a:rPr lang="pt-BR" sz="3600" i="0">
+                        <a:rPr lang="pt-BR" sz="3002">
                           <a:latin typeface="Cambria Math" panose="02040503050406030204" pitchFamily="18" charset="0"/>
                         </a:rPr>
                         <m:t>∙</m:t>
                       </m:r>
                       <m:r>
-                        <a:rPr lang="pt-BR" sz="3600" i="1">
+                        <a:rPr lang="pt-BR" sz="3002" i="1">
                           <a:latin typeface="Cambria Math" panose="02040503050406030204" pitchFamily="18" charset="0"/>
                         </a:rPr>
                         <m:t>𝑆</m:t>
                       </m:r>
                       <m:r>
-                        <a:rPr lang="pt-BR" sz="3600" i="0">
+                        <a:rPr lang="pt-BR" sz="3002">
                           <a:latin typeface="Cambria Math" panose="02040503050406030204" pitchFamily="18" charset="0"/>
                         </a:rPr>
                         <m:t>+</m:t>
@@ -5825,14 +5792,14 @@
                       <m:sSub>
                         <m:sSubPr>
                           <m:ctrlPr>
-                            <a:rPr lang="en-US" sz="3600" b="0" i="1" smtClean="0">
+                            <a:rPr lang="en-US" sz="3002" i="1">
                               <a:latin typeface="Cambria Math" panose="02040503050406030204" pitchFamily="18" charset="0"/>
                             </a:rPr>
                           </m:ctrlPr>
                         </m:sSubPr>
                         <m:e>
                           <m:r>
-                            <a:rPr lang="pt-BR" sz="3600" i="1">
+                            <a:rPr lang="pt-BR" sz="3002" i="1">
                               <a:latin typeface="Cambria Math" panose="02040503050406030204" pitchFamily="18" charset="0"/>
                             </a:rPr>
                             <m:t>𝐾</m:t>
@@ -5840,7 +5807,7 @@
                         </m:e>
                         <m:sub>
                           <m:r>
-                            <a:rPr lang="pt-BR" sz="3600" i="1">
+                            <a:rPr lang="pt-BR" sz="3002" i="1">
                               <a:latin typeface="Cambria Math" panose="02040503050406030204" pitchFamily="18" charset="0"/>
                             </a:rPr>
                             <m:t>𝑥</m:t>
@@ -5848,13 +5815,13 @@
                         </m:sub>
                       </m:sSub>
                       <m:r>
-                        <a:rPr lang="pt-BR" sz="3600" i="0">
+                        <a:rPr lang="pt-BR" sz="3002">
                           <a:latin typeface="Cambria Math" panose="02040503050406030204" pitchFamily="18" charset="0"/>
                         </a:rPr>
                         <m:t>∙</m:t>
                       </m:r>
                       <m:r>
-                        <a:rPr lang="pt-BR" sz="3600" i="1">
+                        <a:rPr lang="pt-BR" sz="3002" i="1">
                           <a:latin typeface="Cambria Math" panose="02040503050406030204" pitchFamily="18" charset="0"/>
                         </a:rPr>
                         <m:t>𝐹</m:t>
@@ -5862,7 +5829,7 @@
                     </m:oMath>
                   </m:oMathPara>
                 </a14:m>
-                <a:endParaRPr lang="pt-BR" sz="3600" dirty="0"/>
+                <a:endParaRPr lang="pt-BR" sz="3376" dirty="0"/>
               </a:p>
             </p:txBody>
           </p:sp>
@@ -5878,14 +5845,14 @@
             </p:nvSpPr>
             <p:spPr>
               <a:xfrm>
-                <a:off x="8760692" y="12084577"/>
-                <a:ext cx="10193388" cy="1144159"/>
+                <a:off x="9736169" y="13928755"/>
+                <a:ext cx="9559376" cy="969048"/>
               </a:xfrm>
               <a:prstGeom prst="rect">
                 <a:avLst/>
               </a:prstGeom>
               <a:blipFill>
-                <a:blip r:embed="rId6"/>
+                <a:blip r:embed="rId7"/>
                 <a:stretch>
                   <a:fillRect/>
                 </a:stretch>
@@ -5916,8 +5883,8 @@
             </p:nvSpPr>
             <p:spPr>
               <a:xfrm>
-                <a:off x="9596010" y="10545136"/>
-                <a:ext cx="7354979" cy="1144159"/>
+                <a:off x="10550954" y="12388991"/>
+                <a:ext cx="6897512" cy="969048"/>
               </a:xfrm>
               <a:prstGeom prst="rect">
                 <a:avLst/>
@@ -5939,20 +5906,20 @@
                       <m:f>
                         <m:fPr>
                           <m:ctrlPr>
-                            <a:rPr lang="pt-BR" sz="3600" i="1" smtClean="0">
+                            <a:rPr lang="pt-BR" sz="3002" i="1">
                               <a:latin typeface="Cambria Math" panose="02040503050406030204" pitchFamily="18" charset="0"/>
                             </a:rPr>
                           </m:ctrlPr>
                         </m:fPr>
                         <m:num>
                           <m:r>
-                            <a:rPr lang="en-US" sz="3600" b="0" i="1" smtClean="0">
+                            <a:rPr lang="en-US" sz="3002" i="1">
                               <a:latin typeface="Cambria Math" panose="02040503050406030204" pitchFamily="18" charset="0"/>
                             </a:rPr>
                             <m:t>𝑑</m:t>
                           </m:r>
                           <m:r>
-                            <a:rPr lang="pt-BR" sz="3600" i="1">
+                            <a:rPr lang="pt-BR" sz="3002" i="1">
                               <a:latin typeface="Cambria Math" panose="02040503050406030204" pitchFamily="18" charset="0"/>
                             </a:rPr>
                             <m:t>𝑒</m:t>
@@ -5963,13 +5930,13 @@
                             <m:rPr>
                               <m:sty m:val="p"/>
                             </m:rPr>
-                            <a:rPr lang="en-US" sz="3600" b="0" i="0" smtClean="0">
+                            <a:rPr lang="en-US" sz="3002">
                               <a:latin typeface="Cambria Math" panose="02040503050406030204" pitchFamily="18" charset="0"/>
                             </a:rPr>
                             <m:t>d</m:t>
                           </m:r>
                           <m:r>
-                            <a:rPr lang="pt-BR" sz="3600" i="1">
+                            <a:rPr lang="pt-BR" sz="3002" i="1">
                               <a:latin typeface="Cambria Math" panose="02040503050406030204" pitchFamily="18" charset="0"/>
                             </a:rPr>
                             <m:t>𝑡</m:t>
@@ -5977,7 +5944,7 @@
                         </m:den>
                       </m:f>
                       <m:r>
-                        <a:rPr lang="pt-BR" sz="3600" i="0">
+                        <a:rPr lang="pt-BR" sz="3002">
                           <a:latin typeface="Cambria Math" panose="02040503050406030204" pitchFamily="18" charset="0"/>
                         </a:rPr>
                         <m:t>=−</m:t>
@@ -5985,14 +5952,14 @@
                       <m:sSub>
                         <m:sSubPr>
                           <m:ctrlPr>
-                            <a:rPr lang="en-US" sz="3600" b="0" i="1" smtClean="0">
+                            <a:rPr lang="en-US" sz="3002" i="1">
                               <a:latin typeface="Cambria Math" panose="02040503050406030204" pitchFamily="18" charset="0"/>
                             </a:rPr>
                           </m:ctrlPr>
                         </m:sSubPr>
                         <m:e>
                           <m:r>
-                            <a:rPr lang="pt-BR" sz="3600" i="1">
+                            <a:rPr lang="pt-BR" sz="3002" i="1">
                               <a:latin typeface="Cambria Math" panose="02040503050406030204" pitchFamily="18" charset="0"/>
                             </a:rPr>
                             <m:t>𝐾</m:t>
@@ -6000,7 +5967,7 @@
                         </m:e>
                         <m:sub>
                           <m:r>
-                            <a:rPr lang="pt-BR" sz="3600" i="0">
+                            <a:rPr lang="pt-BR" sz="3002">
                               <a:latin typeface="Cambria Math" panose="02040503050406030204" pitchFamily="18" charset="0"/>
                             </a:rPr>
                             <m:t>1</m:t>
@@ -6008,19 +5975,19 @@
                         </m:sub>
                       </m:sSub>
                       <m:r>
-                        <a:rPr lang="pt-BR" sz="3600" i="0">
+                        <a:rPr lang="pt-BR" sz="3002">
                           <a:latin typeface="Cambria Math" panose="02040503050406030204" pitchFamily="18" charset="0"/>
                         </a:rPr>
                         <m:t>∙</m:t>
                       </m:r>
                       <m:r>
-                        <a:rPr lang="pt-BR" sz="3600" i="1">
+                        <a:rPr lang="pt-BR" sz="3002" i="1">
                           <a:latin typeface="Cambria Math" panose="02040503050406030204" pitchFamily="18" charset="0"/>
                         </a:rPr>
                         <m:t>𝐸</m:t>
                       </m:r>
                       <m:r>
-                        <a:rPr lang="pt-BR" sz="3600" i="0">
+                        <a:rPr lang="pt-BR" sz="3002">
                           <a:latin typeface="Cambria Math" panose="02040503050406030204" pitchFamily="18" charset="0"/>
                         </a:rPr>
                         <m:t>−</m:t>
@@ -6028,14 +5995,14 @@
                       <m:sSub>
                         <m:sSubPr>
                           <m:ctrlPr>
-                            <a:rPr lang="en-US" sz="3600" b="0" i="1" smtClean="0">
+                            <a:rPr lang="en-US" sz="3002" i="1">
                               <a:latin typeface="Cambria Math" panose="02040503050406030204" pitchFamily="18" charset="0"/>
                             </a:rPr>
                           </m:ctrlPr>
                         </m:sSubPr>
                         <m:e>
                           <m:r>
-                            <a:rPr lang="pt-BR" sz="3600" i="1">
+                            <a:rPr lang="pt-BR" sz="3002" i="1">
                               <a:latin typeface="Cambria Math" panose="02040503050406030204" pitchFamily="18" charset="0"/>
                             </a:rPr>
                             <m:t>𝐾</m:t>
@@ -6043,7 +6010,7 @@
                         </m:e>
                         <m:sub>
                           <m:r>
-                            <a:rPr lang="pt-BR" sz="3600" i="0">
+                            <a:rPr lang="pt-BR" sz="3002">
                               <a:latin typeface="Cambria Math" panose="02040503050406030204" pitchFamily="18" charset="0"/>
                             </a:rPr>
                             <m:t>2</m:t>
@@ -6051,13 +6018,13 @@
                         </m:sub>
                       </m:sSub>
                       <m:r>
-                        <a:rPr lang="pt-BR" sz="3600" i="0">
+                        <a:rPr lang="pt-BR" sz="3002">
                           <a:latin typeface="Cambria Math" panose="02040503050406030204" pitchFamily="18" charset="0"/>
                         </a:rPr>
                         <m:t>∙</m:t>
                       </m:r>
                       <m:r>
-                        <a:rPr lang="pt-BR" sz="3600" i="1">
+                        <a:rPr lang="pt-BR" sz="3002" i="1">
                           <a:latin typeface="Cambria Math" panose="02040503050406030204" pitchFamily="18" charset="0"/>
                         </a:rPr>
                         <m:t>𝐸</m:t>
@@ -6065,7 +6032,7 @@
                     </m:oMath>
                   </m:oMathPara>
                 </a14:m>
-                <a:endParaRPr lang="pt-BR" sz="3600" dirty="0"/>
+                <a:endParaRPr lang="pt-BR" sz="3376" dirty="0"/>
               </a:p>
             </p:txBody>
           </p:sp>
@@ -6081,14 +6048,14 @@
             </p:nvSpPr>
             <p:spPr>
               <a:xfrm>
-                <a:off x="9596010" y="10545136"/>
-                <a:ext cx="7354979" cy="1144159"/>
+                <a:off x="10550954" y="12388991"/>
+                <a:ext cx="6897512" cy="969048"/>
               </a:xfrm>
               <a:prstGeom prst="rect">
                 <a:avLst/>
               </a:prstGeom>
               <a:blipFill>
-                <a:blip r:embed="rId7"/>
+                <a:blip r:embed="rId8"/>
                 <a:stretch>
                   <a:fillRect/>
                 </a:stretch>
@@ -6119,8 +6086,8 @@
             </p:nvSpPr>
             <p:spPr>
               <a:xfrm>
-                <a:off x="10549211" y="13599469"/>
-                <a:ext cx="5918351" cy="1145506"/>
+                <a:off x="12033419" y="15462157"/>
+                <a:ext cx="4968027" cy="970202"/>
               </a:xfrm>
               <a:prstGeom prst="rect">
                 <a:avLst/>
@@ -6142,20 +6109,20 @@
                       <m:f>
                         <m:fPr>
                           <m:ctrlPr>
-                            <a:rPr lang="pt-BR" sz="3600" i="1" smtClean="0">
+                            <a:rPr lang="pt-BR" sz="3002" i="1">
                               <a:latin typeface="Cambria Math" panose="02040503050406030204" pitchFamily="18" charset="0"/>
                             </a:rPr>
                           </m:ctrlPr>
                         </m:fPr>
                         <m:num>
                           <m:r>
-                            <a:rPr lang="en-US" sz="3600" b="0" i="1" smtClean="0">
+                            <a:rPr lang="en-US" sz="3002" i="1">
                               <a:latin typeface="Cambria Math" panose="02040503050406030204" pitchFamily="18" charset="0"/>
                             </a:rPr>
                             <m:t>𝑑</m:t>
                           </m:r>
                           <m:r>
-                            <a:rPr lang="pt-BR" sz="3600" i="1">
+                            <a:rPr lang="pt-BR" sz="3002" i="1">
                               <a:latin typeface="Cambria Math" panose="02040503050406030204" pitchFamily="18" charset="0"/>
                             </a:rPr>
                             <m:t>𝑓</m:t>
@@ -6166,13 +6133,13 @@
                             <m:rPr>
                               <m:sty m:val="p"/>
                             </m:rPr>
-                            <a:rPr lang="en-US" sz="3600" b="0" i="0" smtClean="0">
+                            <a:rPr lang="en-US" sz="3002">
                               <a:latin typeface="Cambria Math" panose="02040503050406030204" pitchFamily="18" charset="0"/>
                             </a:rPr>
                             <m:t>d</m:t>
                           </m:r>
                           <m:r>
-                            <a:rPr lang="pt-BR" sz="3600" i="1">
+                            <a:rPr lang="pt-BR" sz="3002" i="1">
                               <a:latin typeface="Cambria Math" panose="02040503050406030204" pitchFamily="18" charset="0"/>
                             </a:rPr>
                             <m:t>𝑡</m:t>
@@ -6180,7 +6147,7 @@
                         </m:den>
                       </m:f>
                       <m:r>
-                        <a:rPr lang="pt-BR" sz="3600" i="0">
+                        <a:rPr lang="pt-BR" sz="3002">
                           <a:latin typeface="Cambria Math" panose="02040503050406030204" pitchFamily="18" charset="0"/>
                         </a:rPr>
                         <m:t>=</m:t>
@@ -6188,14 +6155,14 @@
                       <m:sSub>
                         <m:sSubPr>
                           <m:ctrlPr>
-                            <a:rPr lang="en-US" sz="3600" b="0" i="1" smtClean="0">
+                            <a:rPr lang="en-US" sz="3002" i="1">
                               <a:latin typeface="Cambria Math" panose="02040503050406030204" pitchFamily="18" charset="0"/>
                             </a:rPr>
                           </m:ctrlPr>
                         </m:sSubPr>
                         <m:e>
                           <m:r>
-                            <a:rPr lang="pt-BR" sz="3600" i="1">
+                            <a:rPr lang="pt-BR" sz="3002" i="1">
                               <a:latin typeface="Cambria Math" panose="02040503050406030204" pitchFamily="18" charset="0"/>
                             </a:rPr>
                             <m:t>𝐾</m:t>
@@ -6203,7 +6170,7 @@
                         </m:e>
                         <m:sub>
                           <m:r>
-                            <a:rPr lang="pt-BR" sz="3600" i="0">
+                            <a:rPr lang="pt-BR" sz="3002">
                               <a:latin typeface="Cambria Math" panose="02040503050406030204" pitchFamily="18" charset="0"/>
                             </a:rPr>
                             <m:t>3</m:t>
@@ -6211,19 +6178,19 @@
                         </m:sub>
                       </m:sSub>
                       <m:r>
-                        <a:rPr lang="pt-BR" sz="3600" i="0">
+                        <a:rPr lang="pt-BR" sz="3002">
                           <a:latin typeface="Cambria Math" panose="02040503050406030204" pitchFamily="18" charset="0"/>
                         </a:rPr>
                         <m:t>∙</m:t>
                       </m:r>
                       <m:r>
-                        <a:rPr lang="pt-BR" sz="3600" i="1">
+                        <a:rPr lang="pt-BR" sz="3002" i="1">
                           <a:latin typeface="Cambria Math" panose="02040503050406030204" pitchFamily="18" charset="0"/>
                         </a:rPr>
                         <m:t>𝑆</m:t>
                       </m:r>
                       <m:r>
-                        <a:rPr lang="pt-BR" sz="3600" i="0">
+                        <a:rPr lang="pt-BR" sz="3002">
                           <a:latin typeface="Cambria Math" panose="02040503050406030204" pitchFamily="18" charset="0"/>
                         </a:rPr>
                         <m:t>−</m:t>
@@ -6231,14 +6198,14 @@
                       <m:sSub>
                         <m:sSubPr>
                           <m:ctrlPr>
-                            <a:rPr lang="en-US" sz="3600" b="0" i="1" smtClean="0">
+                            <a:rPr lang="en-US" sz="3002" i="1">
                               <a:latin typeface="Cambria Math" panose="02040503050406030204" pitchFamily="18" charset="0"/>
                             </a:rPr>
                           </m:ctrlPr>
                         </m:sSubPr>
                         <m:e>
                           <m:r>
-                            <a:rPr lang="pt-BR" sz="3600" i="1">
+                            <a:rPr lang="pt-BR" sz="3002" i="1">
                               <a:latin typeface="Cambria Math" panose="02040503050406030204" pitchFamily="18" charset="0"/>
                             </a:rPr>
                             <m:t>𝐾</m:t>
@@ -6246,7 +6213,7 @@
                         </m:e>
                         <m:sub>
                           <m:r>
-                            <a:rPr lang="pt-BR" sz="3600" i="0">
+                            <a:rPr lang="pt-BR" sz="3002">
                               <a:latin typeface="Cambria Math" panose="02040503050406030204" pitchFamily="18" charset="0"/>
                             </a:rPr>
                             <m:t>4</m:t>
@@ -6254,19 +6221,19 @@
                         </m:sub>
                       </m:sSub>
                       <m:r>
-                        <a:rPr lang="pt-BR" sz="3600" i="0">
+                        <a:rPr lang="pt-BR" sz="3002">
                           <a:latin typeface="Cambria Math" panose="02040503050406030204" pitchFamily="18" charset="0"/>
                         </a:rPr>
                         <m:t>∙</m:t>
                       </m:r>
                       <m:r>
-                        <a:rPr lang="pt-BR" sz="3600" i="1">
+                        <a:rPr lang="pt-BR" sz="3002" i="1">
                           <a:latin typeface="Cambria Math" panose="02040503050406030204" pitchFamily="18" charset="0"/>
                         </a:rPr>
                         <m:t>𝐹</m:t>
                       </m:r>
                       <m:r>
-                        <a:rPr lang="pt-BR" sz="3600" i="0">
+                        <a:rPr lang="pt-BR" sz="3002">
                           <a:latin typeface="Cambria Math" panose="02040503050406030204" pitchFamily="18" charset="0"/>
                         </a:rPr>
                         <m:t>−</m:t>
@@ -6274,14 +6241,14 @@
                       <m:sSub>
                         <m:sSubPr>
                           <m:ctrlPr>
-                            <a:rPr lang="en-US" sz="3600" b="0" i="1" smtClean="0">
+                            <a:rPr lang="en-US" sz="3002" i="1">
                               <a:latin typeface="Cambria Math" panose="02040503050406030204" pitchFamily="18" charset="0"/>
                             </a:rPr>
                           </m:ctrlPr>
                         </m:sSubPr>
                         <m:e>
                           <m:r>
-                            <a:rPr lang="pt-BR" sz="3600" i="1">
+                            <a:rPr lang="pt-BR" sz="3002" i="1">
                               <a:latin typeface="Cambria Math" panose="02040503050406030204" pitchFamily="18" charset="0"/>
                             </a:rPr>
                             <m:t>𝐾</m:t>
@@ -6289,7 +6256,7 @@
                         </m:e>
                         <m:sub>
                           <m:r>
-                            <a:rPr lang="pt-BR" sz="3600" i="1">
+                            <a:rPr lang="pt-BR" sz="3002" i="1">
                               <a:latin typeface="Cambria Math" panose="02040503050406030204" pitchFamily="18" charset="0"/>
                             </a:rPr>
                             <m:t>𝑥</m:t>
@@ -6297,13 +6264,13 @@
                         </m:sub>
                       </m:sSub>
                       <m:r>
-                        <a:rPr lang="pt-BR" sz="3600" i="0">
+                        <a:rPr lang="pt-BR" sz="3002">
                           <a:latin typeface="Cambria Math" panose="02040503050406030204" pitchFamily="18" charset="0"/>
                         </a:rPr>
                         <m:t>∙</m:t>
                       </m:r>
                       <m:r>
-                        <a:rPr lang="pt-BR" sz="3600" i="1">
+                        <a:rPr lang="pt-BR" sz="3002" i="1">
                           <a:latin typeface="Cambria Math" panose="02040503050406030204" pitchFamily="18" charset="0"/>
                         </a:rPr>
                         <m:t>𝐹</m:t>
@@ -6311,7 +6278,7 @@
                     </m:oMath>
                   </m:oMathPara>
                 </a14:m>
-                <a:endParaRPr lang="pt-BR" sz="3600" dirty="0"/>
+                <a:endParaRPr lang="pt-BR" sz="3376" dirty="0"/>
               </a:p>
             </p:txBody>
           </p:sp>
@@ -6327,14 +6294,14 @@
             </p:nvSpPr>
             <p:spPr>
               <a:xfrm>
-                <a:off x="10549211" y="13599469"/>
-                <a:ext cx="5918351" cy="1145506"/>
+                <a:off x="12033419" y="15462157"/>
+                <a:ext cx="4968027" cy="970202"/>
               </a:xfrm>
               <a:prstGeom prst="rect">
                 <a:avLst/>
               </a:prstGeom>
               <a:blipFill>
-                <a:blip r:embed="rId8"/>
+                <a:blip r:embed="rId9"/>
                 <a:stretch>
                   <a:fillRect/>
                 </a:stretch>
@@ -6357,35 +6324,6 @@
       </mc:AlternateContent>
       <p:pic>
         <p:nvPicPr>
-          <p:cNvPr id="110" name="Espaço Reservado para Conteúdo 109"/>
-          <p:cNvPicPr>
-            <a:picLocks noGrp="1" noChangeAspect="1"/>
-          </p:cNvPicPr>
-          <p:nvPr>
-            <p:ph sz="quarter" idx="32"/>
-          </p:nvPr>
-        </p:nvPicPr>
-        <p:blipFill>
-          <a:blip r:embed="rId9">
-            <a:extLst>
-              <a:ext uri="{28A0092B-C50C-407E-A947-70E740481C1C}">
-                <a14:useLocalDpi xmlns:a14="http://schemas.microsoft.com/office/drawing/2010/main" val="0"/>
-              </a:ext>
-            </a:extLst>
-          </a:blip>
-          <a:stretch>
-            <a:fillRect/>
-          </a:stretch>
-        </p:blipFill>
-        <p:spPr>
-          <a:xfrm>
-            <a:off x="21259292" y="4606414"/>
-            <a:ext cx="7002147" cy="4525405"/>
-          </a:xfrm>
-        </p:spPr>
-      </p:pic>
-      <p:pic>
-        <p:nvPicPr>
           <p:cNvPr id="112" name="Imagem 111"/>
           <p:cNvPicPr>
             <a:picLocks noChangeAspect="1"/>
@@ -6405,8 +6343,8 @@
         </p:blipFill>
         <p:spPr>
           <a:xfrm>
-            <a:off x="21259292" y="9104969"/>
-            <a:ext cx="7118105" cy="4650091"/>
+            <a:off x="22080747" y="10300312"/>
+            <a:ext cx="6675371" cy="4360863"/>
           </a:xfrm>
           <a:prstGeom prst="rect">
             <a:avLst/>
@@ -6435,8 +6373,8 @@
         </p:blipFill>
         <p:spPr>
           <a:xfrm>
-            <a:off x="10406687" y="16388499"/>
-            <a:ext cx="7248423" cy="4949530"/>
+            <a:off x="11959553" y="20758782"/>
+            <a:ext cx="7055278" cy="4817642"/>
           </a:xfrm>
           <a:prstGeom prst="rect">
             <a:avLst/>
@@ -6445,13 +6383,13 @@
       </p:pic>
       <p:pic>
         <p:nvPicPr>
-          <p:cNvPr id="3" name="Imagem 2"/>
+          <p:cNvPr id="13" name="Imagem 12"/>
           <p:cNvPicPr>
             <a:picLocks noChangeAspect="1"/>
           </p:cNvPicPr>
           <p:nvPr/>
         </p:nvPicPr>
-        <p:blipFill>
+        <p:blipFill rotWithShape="1">
           <a:blip r:embed="rId12">
             <a:extLst>
               <a:ext uri="{28A0092B-C50C-407E-A947-70E740481C1C}">
@@ -6459,20 +6397,54 @@
               </a:ext>
             </a:extLst>
           </a:blip>
-          <a:stretch>
-            <a:fillRect/>
-          </a:stretch>
+          <a:srcRect r="11016"/>
+          <a:stretch/>
         </p:blipFill>
         <p:spPr>
           <a:xfrm>
-            <a:off x="19481921" y="2956556"/>
-            <a:ext cx="9083767" cy="6048000"/>
+            <a:off x="21760671" y="20878884"/>
+            <a:ext cx="9453041" cy="3484656"/>
           </a:xfrm>
           <a:prstGeom prst="rect">
             <a:avLst/>
           </a:prstGeom>
         </p:spPr>
       </p:pic>
+      <p:sp>
+        <p:nvSpPr>
+          <p:cNvPr id="82" name="CaixaDeTexto 81"/>
+          <p:cNvSpPr txBox="1"/>
+          <p:nvPr/>
+        </p:nvSpPr>
+        <p:spPr>
+          <a:xfrm>
+            <a:off x="11458376" y="18648951"/>
+            <a:ext cx="8529121" cy="1292662"/>
+          </a:xfrm>
+          <a:prstGeom prst="rect">
+            <a:avLst/>
+          </a:prstGeom>
+          <a:noFill/>
+        </p:spPr>
+        <p:txBody>
+          <a:bodyPr wrap="square" rtlCol="0">
+            <a:spAutoFit/>
+          </a:bodyPr>
+          <a:lstStyle/>
+          <a:p>
+            <a:r>
+              <a:rPr lang="pt-BR" sz="2600" dirty="0"/>
+              <a:t>Primeira iteração, comprovando a acumulação do anabólico no corpo:</a:t>
+            </a:r>
+          </a:p>
+          <a:p>
+            <a:r>
+              <a:rPr lang="pt-BR" sz="2600" dirty="0"/>
+              <a:t> </a:t>
+            </a:r>
+          </a:p>
+        </p:txBody>
+      </p:sp>
     </p:spTree>
     <p:extLst>
       <p:ext uri="{BB962C8B-B14F-4D97-AF65-F5344CB8AC3E}">

</xml_diff>

<commit_message>
PPT FINAL CORRIGIDO PELA MINHA MAE AOHEUOAHEOUAHO
</commit_message>
<xml_diff>
--- a/MODELAGEM E SIMULACAO DO MUNDO FISICO PROJETO 2.pptx
+++ b/MODELAGEM E SIMULACAO DO MUNDO FISICO PROJETO 2.pptx
@@ -5005,7 +5005,7 @@
             <a:pPr algn="just"/>
             <a:r>
               <a:rPr lang="pt-BR" sz="3100" dirty="0"/>
-              <a:t>Para o começo desse projeto você deve ter em mente alguns fatores:</a:t>
+              <a:t>Para início desse projeto você deve ter em mente alguns fatores:</a:t>
             </a:r>
           </a:p>
           <a:p>
@@ -5135,7 +5135,7 @@
             <a:pPr algn="just"/>
             <a:r>
               <a:rPr lang="pt-BR" sz="2800" dirty="0"/>
-              <a:t>O estoque Estomago representa o sistema digestório inteiro;</a:t>
+              <a:t>O estoque Estômago representa o sistema digestório inteiro;</a:t>
             </a:r>
           </a:p>
           <a:p>
@@ -5199,7 +5199,7 @@
           <a:p>
             <a:r>
               <a:rPr lang="pt-BR" dirty="0"/>
-              <a:t>Equações diferencias </a:t>
+              <a:t>Equações diferenciais </a:t>
             </a:r>
           </a:p>
         </p:txBody>
@@ -5316,7 +5316,7 @@
         </p:blipFill>
         <p:spPr>
           <a:xfrm>
-            <a:off x="22365570" y="6178152"/>
+            <a:off x="22365570" y="5978759"/>
             <a:ext cx="6137526" cy="3966610"/>
           </a:xfrm>
         </p:spPr>
@@ -5333,7 +5333,7 @@
         </p:nvSpPr>
         <p:spPr>
           <a:xfrm>
-            <a:off x="21531603" y="15111971"/>
+            <a:off x="22096890" y="14876393"/>
             <a:ext cx="9460441" cy="1005299"/>
           </a:xfrm>
         </p:spPr>
@@ -5361,7 +5361,7 @@
         </p:nvSpPr>
         <p:spPr>
           <a:xfrm>
-            <a:off x="21551285" y="16387668"/>
+            <a:off x="21985066" y="15947258"/>
             <a:ext cx="9460441" cy="3582521"/>
           </a:xfrm>
         </p:spPr>
@@ -5373,7 +5373,7 @@
           <a:p>
             <a:r>
               <a:rPr lang="pt-BR" sz="2600" dirty="0"/>
-              <a:t>Para doses abaixo de 10 mg/dia não há ganhos significativos assim como acima de 41 mg/dia há grandes chances de </a:t>
+              <a:t>Para doses abaixo de 10 mg/dia não há ganhos significativos, assim como acima de 41 mg/dia há grandes chances de o atleta desenvolver uma patologia.</a:t>
             </a:r>
           </a:p>
           <a:p>
@@ -5385,13 +5385,8 @@
           <a:p>
             <a:r>
               <a:rPr lang="pt-BR" sz="2600" dirty="0"/>
-              <a:t>Por final, ao procurar na literatura, pode-se achar o gráfico com um comportamento similar ao do modelo, validando assim </a:t>
-            </a:r>
-            <a:r>
-              <a:rPr lang="pt-BR" sz="2600"/>
-              <a:t>a hipótese:</a:t>
-            </a:r>
-            <a:endParaRPr lang="pt-BR" sz="2600" dirty="0"/>
+              <a:t>Por final, ao procurar na literatura, pode-se achar o gráfico com um comportamento similar ao do modelo, validando assim a hipótese:</a:t>
+            </a:r>
           </a:p>
         </p:txBody>
       </p:sp>
@@ -5417,7 +5412,7 @@
           <a:p>
             <a:r>
               <a:rPr lang="pt-BR" dirty="0"/>
-              <a:t>Referencias</a:t>
+              <a:t>Referências</a:t>
             </a:r>
           </a:p>
         </p:txBody>
@@ -5439,22 +5434,24 @@
           </a:xfrm>
         </p:spPr>
         <p:txBody>
-          <a:bodyPr/>
+          <a:bodyPr>
+            <a:noAutofit/>
+          </a:bodyPr>
           <a:lstStyle/>
           <a:p>
             <a:r>
-              <a:rPr lang="pt-BR"/>
+              <a:rPr lang="pt-BR" sz="2600" dirty="0"/>
               <a:t>Todos os links no GitHub.</a:t>
             </a:r>
           </a:p>
           <a:p>
             <a:r>
-              <a:rPr lang="pt-BR">
+              <a:rPr lang="pt-BR" sz="2600" dirty="0">
                 <a:hlinkClick r:id="rId4" action="ppaction://hlinkfile"/>
               </a:rPr>
               <a:t>https://github.com/AntonioAndraues/ProjetoModSim/blob/master/Links</a:t>
             </a:r>
-            <a:endParaRPr lang="pt-BR" dirty="0"/>
+            <a:endParaRPr lang="pt-BR" sz="2600" dirty="0"/>
           </a:p>
         </p:txBody>
       </p:sp>
@@ -5637,8 +5634,8 @@
             </p:nvSpPr>
             <p:spPr>
               <a:xfrm>
-                <a:off x="9736169" y="13928755"/>
-                <a:ext cx="9559376" cy="969048"/>
+                <a:off x="10428121" y="13819696"/>
+                <a:ext cx="9559376" cy="1144159"/>
               </a:xfrm>
               <a:prstGeom prst="rect">
                 <a:avLst/>
@@ -5660,20 +5657,20 @@
                       <m:f>
                         <m:fPr>
                           <m:ctrlPr>
-                            <a:rPr lang="pt-BR" sz="3002" i="1">
+                            <a:rPr lang="pt-BR" sz="3600" i="1">
                               <a:latin typeface="Cambria Math" panose="02040503050406030204" pitchFamily="18" charset="0"/>
                             </a:rPr>
                           </m:ctrlPr>
                         </m:fPr>
                         <m:num>
                           <m:r>
-                            <a:rPr lang="en-US" sz="3002" i="1">
+                            <a:rPr lang="en-US" sz="3600" i="1">
                               <a:latin typeface="Cambria Math" panose="02040503050406030204" pitchFamily="18" charset="0"/>
                             </a:rPr>
                             <m:t>𝑑</m:t>
                           </m:r>
                           <m:r>
-                            <a:rPr lang="pt-BR" sz="3002" i="1">
+                            <a:rPr lang="pt-BR" sz="3600" i="1">
                               <a:latin typeface="Cambria Math" panose="02040503050406030204" pitchFamily="18" charset="0"/>
                             </a:rPr>
                             <m:t>𝑠</m:t>
@@ -5684,13 +5681,13 @@
                             <m:rPr>
                               <m:sty m:val="p"/>
                             </m:rPr>
-                            <a:rPr lang="en-US" sz="3002">
+                            <a:rPr lang="en-US" sz="3600">
                               <a:latin typeface="Cambria Math" panose="02040503050406030204" pitchFamily="18" charset="0"/>
                             </a:rPr>
                             <m:t>d</m:t>
                           </m:r>
                           <m:r>
-                            <a:rPr lang="pt-BR" sz="3002" i="1">
+                            <a:rPr lang="pt-BR" sz="3600" i="1">
                               <a:latin typeface="Cambria Math" panose="02040503050406030204" pitchFamily="18" charset="0"/>
                             </a:rPr>
                             <m:t>𝑡</m:t>
@@ -5698,7 +5695,7 @@
                         </m:den>
                       </m:f>
                       <m:r>
-                        <a:rPr lang="pt-BR" sz="3002">
+                        <a:rPr lang="pt-BR" sz="3600">
                           <a:latin typeface="Cambria Math" panose="02040503050406030204" pitchFamily="18" charset="0"/>
                         </a:rPr>
                         <m:t>=</m:t>
@@ -5706,14 +5703,14 @@
                       <m:sSub>
                         <m:sSubPr>
                           <m:ctrlPr>
-                            <a:rPr lang="en-US" sz="3002" i="1">
+                            <a:rPr lang="en-US" sz="3600" i="1">
                               <a:latin typeface="Cambria Math" panose="02040503050406030204" pitchFamily="18" charset="0"/>
                             </a:rPr>
                           </m:ctrlPr>
                         </m:sSubPr>
                         <m:e>
                           <m:r>
-                            <a:rPr lang="pt-BR" sz="3002" i="1">
+                            <a:rPr lang="pt-BR" sz="3600" i="1">
                               <a:latin typeface="Cambria Math" panose="02040503050406030204" pitchFamily="18" charset="0"/>
                             </a:rPr>
                             <m:t>𝐾</m:t>
@@ -5721,7 +5718,7 @@
                         </m:e>
                         <m:sub>
                           <m:r>
-                            <a:rPr lang="pt-BR" sz="3002">
+                            <a:rPr lang="pt-BR" sz="3600">
                               <a:latin typeface="Cambria Math" panose="02040503050406030204" pitchFamily="18" charset="0"/>
                             </a:rPr>
                             <m:t>2</m:t>
@@ -5729,19 +5726,19 @@
                         </m:sub>
                       </m:sSub>
                       <m:r>
-                        <a:rPr lang="pt-BR" sz="3002">
+                        <a:rPr lang="pt-BR" sz="3600">
                           <a:latin typeface="Cambria Math" panose="02040503050406030204" pitchFamily="18" charset="0"/>
                         </a:rPr>
                         <m:t>∙</m:t>
                       </m:r>
                       <m:r>
-                        <a:rPr lang="pt-BR" sz="3002" i="1">
+                        <a:rPr lang="pt-BR" sz="3600" i="1">
                           <a:latin typeface="Cambria Math" panose="02040503050406030204" pitchFamily="18" charset="0"/>
                         </a:rPr>
                         <m:t>𝐸</m:t>
                       </m:r>
                       <m:r>
-                        <a:rPr lang="pt-BR" sz="3002">
+                        <a:rPr lang="pt-BR" sz="3600">
                           <a:latin typeface="Cambria Math" panose="02040503050406030204" pitchFamily="18" charset="0"/>
                         </a:rPr>
                         <m:t>−</m:t>
@@ -5749,14 +5746,14 @@
                       <m:sSub>
                         <m:sSubPr>
                           <m:ctrlPr>
-                            <a:rPr lang="en-US" sz="3002" i="1">
+                            <a:rPr lang="en-US" sz="3600" i="1">
                               <a:latin typeface="Cambria Math" panose="02040503050406030204" pitchFamily="18" charset="0"/>
                             </a:rPr>
                           </m:ctrlPr>
                         </m:sSubPr>
                         <m:e>
                           <m:r>
-                            <a:rPr lang="pt-BR" sz="3002" i="1">
+                            <a:rPr lang="pt-BR" sz="3600" i="1">
                               <a:latin typeface="Cambria Math" panose="02040503050406030204" pitchFamily="18" charset="0"/>
                             </a:rPr>
                             <m:t>𝐾</m:t>
@@ -5764,7 +5761,7 @@
                         </m:e>
                         <m:sub>
                           <m:r>
-                            <a:rPr lang="pt-BR" sz="3002">
+                            <a:rPr lang="pt-BR" sz="3600">
                               <a:latin typeface="Cambria Math" panose="02040503050406030204" pitchFamily="18" charset="0"/>
                             </a:rPr>
                             <m:t>3</m:t>
@@ -5772,19 +5769,19 @@
                         </m:sub>
                       </m:sSub>
                       <m:r>
-                        <a:rPr lang="pt-BR" sz="3002">
+                        <a:rPr lang="pt-BR" sz="3600">
                           <a:latin typeface="Cambria Math" panose="02040503050406030204" pitchFamily="18" charset="0"/>
                         </a:rPr>
                         <m:t>∙</m:t>
                       </m:r>
                       <m:r>
-                        <a:rPr lang="pt-BR" sz="3002" i="1">
+                        <a:rPr lang="pt-BR" sz="3600" i="1">
                           <a:latin typeface="Cambria Math" panose="02040503050406030204" pitchFamily="18" charset="0"/>
                         </a:rPr>
                         <m:t>𝑆</m:t>
                       </m:r>
                       <m:r>
-                        <a:rPr lang="pt-BR" sz="3002">
+                        <a:rPr lang="pt-BR" sz="3600">
                           <a:latin typeface="Cambria Math" panose="02040503050406030204" pitchFamily="18" charset="0"/>
                         </a:rPr>
                         <m:t>+</m:t>
@@ -5792,14 +5789,14 @@
                       <m:sSub>
                         <m:sSubPr>
                           <m:ctrlPr>
-                            <a:rPr lang="en-US" sz="3002" i="1">
+                            <a:rPr lang="en-US" sz="3600" i="1">
                               <a:latin typeface="Cambria Math" panose="02040503050406030204" pitchFamily="18" charset="0"/>
                             </a:rPr>
                           </m:ctrlPr>
                         </m:sSubPr>
                         <m:e>
                           <m:r>
-                            <a:rPr lang="pt-BR" sz="3002" i="1">
+                            <a:rPr lang="pt-BR" sz="3600" i="1">
                               <a:latin typeface="Cambria Math" panose="02040503050406030204" pitchFamily="18" charset="0"/>
                             </a:rPr>
                             <m:t>𝐾</m:t>
@@ -5807,7 +5804,7 @@
                         </m:e>
                         <m:sub>
                           <m:r>
-                            <a:rPr lang="pt-BR" sz="3002" i="1">
+                            <a:rPr lang="pt-BR" sz="3600" i="1">
                               <a:latin typeface="Cambria Math" panose="02040503050406030204" pitchFamily="18" charset="0"/>
                             </a:rPr>
                             <m:t>𝑥</m:t>
@@ -5815,13 +5812,13 @@
                         </m:sub>
                       </m:sSub>
                       <m:r>
-                        <a:rPr lang="pt-BR" sz="3002">
+                        <a:rPr lang="pt-BR" sz="3600">
                           <a:latin typeface="Cambria Math" panose="02040503050406030204" pitchFamily="18" charset="0"/>
                         </a:rPr>
                         <m:t>∙</m:t>
                       </m:r>
                       <m:r>
-                        <a:rPr lang="pt-BR" sz="3002" i="1">
+                        <a:rPr lang="pt-BR" sz="3600" i="1">
                           <a:latin typeface="Cambria Math" panose="02040503050406030204" pitchFamily="18" charset="0"/>
                         </a:rPr>
                         <m:t>𝐹</m:t>
@@ -5845,8 +5842,8 @@
             </p:nvSpPr>
             <p:spPr>
               <a:xfrm>
-                <a:off x="9736169" y="13928755"/>
-                <a:ext cx="9559376" cy="969048"/>
+                <a:off x="10428121" y="13819696"/>
+                <a:ext cx="9559376" cy="1144159"/>
               </a:xfrm>
               <a:prstGeom prst="rect">
                 <a:avLst/>
@@ -5883,8 +5880,8 @@
             </p:nvSpPr>
             <p:spPr>
               <a:xfrm>
-                <a:off x="10550954" y="12388991"/>
-                <a:ext cx="6897512" cy="969048"/>
+                <a:off x="11135039" y="12177235"/>
+                <a:ext cx="6897512" cy="1144159"/>
               </a:xfrm>
               <a:prstGeom prst="rect">
                 <a:avLst/>
@@ -5906,20 +5903,20 @@
                       <m:f>
                         <m:fPr>
                           <m:ctrlPr>
-                            <a:rPr lang="pt-BR" sz="3002" i="1">
+                            <a:rPr lang="pt-BR" sz="3600" i="1">
                               <a:latin typeface="Cambria Math" panose="02040503050406030204" pitchFamily="18" charset="0"/>
                             </a:rPr>
                           </m:ctrlPr>
                         </m:fPr>
                         <m:num>
                           <m:r>
-                            <a:rPr lang="en-US" sz="3002" i="1">
+                            <a:rPr lang="en-US" sz="3600" i="1">
                               <a:latin typeface="Cambria Math" panose="02040503050406030204" pitchFamily="18" charset="0"/>
                             </a:rPr>
                             <m:t>𝑑</m:t>
                           </m:r>
                           <m:r>
-                            <a:rPr lang="pt-BR" sz="3002" i="1">
+                            <a:rPr lang="pt-BR" sz="3600" i="1">
                               <a:latin typeface="Cambria Math" panose="02040503050406030204" pitchFamily="18" charset="0"/>
                             </a:rPr>
                             <m:t>𝑒</m:t>
@@ -5930,13 +5927,13 @@
                             <m:rPr>
                               <m:sty m:val="p"/>
                             </m:rPr>
-                            <a:rPr lang="en-US" sz="3002">
+                            <a:rPr lang="en-US" sz="3600">
                               <a:latin typeface="Cambria Math" panose="02040503050406030204" pitchFamily="18" charset="0"/>
                             </a:rPr>
                             <m:t>d</m:t>
                           </m:r>
                           <m:r>
-                            <a:rPr lang="pt-BR" sz="3002" i="1">
+                            <a:rPr lang="pt-BR" sz="3600" i="1">
                               <a:latin typeface="Cambria Math" panose="02040503050406030204" pitchFamily="18" charset="0"/>
                             </a:rPr>
                             <m:t>𝑡</m:t>
@@ -5944,7 +5941,7 @@
                         </m:den>
                       </m:f>
                       <m:r>
-                        <a:rPr lang="pt-BR" sz="3002">
+                        <a:rPr lang="pt-BR" sz="3600">
                           <a:latin typeface="Cambria Math" panose="02040503050406030204" pitchFamily="18" charset="0"/>
                         </a:rPr>
                         <m:t>=−</m:t>
@@ -5952,14 +5949,14 @@
                       <m:sSub>
                         <m:sSubPr>
                           <m:ctrlPr>
-                            <a:rPr lang="en-US" sz="3002" i="1">
+                            <a:rPr lang="en-US" sz="3600" i="1">
                               <a:latin typeface="Cambria Math" panose="02040503050406030204" pitchFamily="18" charset="0"/>
                             </a:rPr>
                           </m:ctrlPr>
                         </m:sSubPr>
                         <m:e>
                           <m:r>
-                            <a:rPr lang="pt-BR" sz="3002" i="1">
+                            <a:rPr lang="pt-BR" sz="3600" i="1">
                               <a:latin typeface="Cambria Math" panose="02040503050406030204" pitchFamily="18" charset="0"/>
                             </a:rPr>
                             <m:t>𝐾</m:t>
@@ -5967,7 +5964,7 @@
                         </m:e>
                         <m:sub>
                           <m:r>
-                            <a:rPr lang="pt-BR" sz="3002">
+                            <a:rPr lang="pt-BR" sz="3600">
                               <a:latin typeface="Cambria Math" panose="02040503050406030204" pitchFamily="18" charset="0"/>
                             </a:rPr>
                             <m:t>1</m:t>
@@ -5975,19 +5972,19 @@
                         </m:sub>
                       </m:sSub>
                       <m:r>
-                        <a:rPr lang="pt-BR" sz="3002">
+                        <a:rPr lang="pt-BR" sz="3600">
                           <a:latin typeface="Cambria Math" panose="02040503050406030204" pitchFamily="18" charset="0"/>
                         </a:rPr>
                         <m:t>∙</m:t>
                       </m:r>
                       <m:r>
-                        <a:rPr lang="pt-BR" sz="3002" i="1">
+                        <a:rPr lang="pt-BR" sz="3600" i="1">
                           <a:latin typeface="Cambria Math" panose="02040503050406030204" pitchFamily="18" charset="0"/>
                         </a:rPr>
                         <m:t>𝐸</m:t>
                       </m:r>
                       <m:r>
-                        <a:rPr lang="pt-BR" sz="3002">
+                        <a:rPr lang="pt-BR" sz="3600">
                           <a:latin typeface="Cambria Math" panose="02040503050406030204" pitchFamily="18" charset="0"/>
                         </a:rPr>
                         <m:t>−</m:t>
@@ -5995,14 +5992,14 @@
                       <m:sSub>
                         <m:sSubPr>
                           <m:ctrlPr>
-                            <a:rPr lang="en-US" sz="3002" i="1">
+                            <a:rPr lang="en-US" sz="3600" i="1">
                               <a:latin typeface="Cambria Math" panose="02040503050406030204" pitchFamily="18" charset="0"/>
                             </a:rPr>
                           </m:ctrlPr>
                         </m:sSubPr>
                         <m:e>
                           <m:r>
-                            <a:rPr lang="pt-BR" sz="3002" i="1">
+                            <a:rPr lang="pt-BR" sz="3600" i="1">
                               <a:latin typeface="Cambria Math" panose="02040503050406030204" pitchFamily="18" charset="0"/>
                             </a:rPr>
                             <m:t>𝐾</m:t>
@@ -6010,7 +6007,7 @@
                         </m:e>
                         <m:sub>
                           <m:r>
-                            <a:rPr lang="pt-BR" sz="3002">
+                            <a:rPr lang="pt-BR" sz="3600">
                               <a:latin typeface="Cambria Math" panose="02040503050406030204" pitchFamily="18" charset="0"/>
                             </a:rPr>
                             <m:t>2</m:t>
@@ -6018,13 +6015,13 @@
                         </m:sub>
                       </m:sSub>
                       <m:r>
-                        <a:rPr lang="pt-BR" sz="3002">
+                        <a:rPr lang="pt-BR" sz="3600">
                           <a:latin typeface="Cambria Math" panose="02040503050406030204" pitchFamily="18" charset="0"/>
                         </a:rPr>
                         <m:t>∙</m:t>
                       </m:r>
                       <m:r>
-                        <a:rPr lang="pt-BR" sz="3002" i="1">
+                        <a:rPr lang="pt-BR" sz="3600" i="1">
                           <a:latin typeface="Cambria Math" panose="02040503050406030204" pitchFamily="18" charset="0"/>
                         </a:rPr>
                         <m:t>𝐸</m:t>
@@ -6048,8 +6045,8 @@
             </p:nvSpPr>
             <p:spPr>
               <a:xfrm>
-                <a:off x="10550954" y="12388991"/>
-                <a:ext cx="6897512" cy="969048"/>
+                <a:off x="11135039" y="12177235"/>
+                <a:ext cx="6897512" cy="1144159"/>
               </a:xfrm>
               <a:prstGeom prst="rect">
                 <a:avLst/>
@@ -6087,14 +6084,14 @@
             <p:spPr>
               <a:xfrm>
                 <a:off x="12033419" y="15462157"/>
-                <a:ext cx="4968027" cy="970202"/>
+                <a:ext cx="6635672" cy="1145506"/>
               </a:xfrm>
               <a:prstGeom prst="rect">
                 <a:avLst/>
               </a:prstGeom>
             </p:spPr>
             <p:txBody>
-              <a:bodyPr wrap="none">
+              <a:bodyPr wrap="square">
                 <a:spAutoFit/>
               </a:bodyPr>
               <a:lstStyle/>
@@ -6109,20 +6106,20 @@
                       <m:f>
                         <m:fPr>
                           <m:ctrlPr>
-                            <a:rPr lang="pt-BR" sz="3002" i="1">
+                            <a:rPr lang="pt-BR" sz="3600" i="1">
                               <a:latin typeface="Cambria Math" panose="02040503050406030204" pitchFamily="18" charset="0"/>
                             </a:rPr>
                           </m:ctrlPr>
                         </m:fPr>
                         <m:num>
                           <m:r>
-                            <a:rPr lang="en-US" sz="3002" i="1">
+                            <a:rPr lang="en-US" sz="3600" i="1">
                               <a:latin typeface="Cambria Math" panose="02040503050406030204" pitchFamily="18" charset="0"/>
                             </a:rPr>
                             <m:t>𝑑</m:t>
                           </m:r>
                           <m:r>
-                            <a:rPr lang="pt-BR" sz="3002" i="1">
+                            <a:rPr lang="pt-BR" sz="3600" i="1">
                               <a:latin typeface="Cambria Math" panose="02040503050406030204" pitchFamily="18" charset="0"/>
                             </a:rPr>
                             <m:t>𝑓</m:t>
@@ -6133,13 +6130,13 @@
                             <m:rPr>
                               <m:sty m:val="p"/>
                             </m:rPr>
-                            <a:rPr lang="en-US" sz="3002">
+                            <a:rPr lang="en-US" sz="3600">
                               <a:latin typeface="Cambria Math" panose="02040503050406030204" pitchFamily="18" charset="0"/>
                             </a:rPr>
                             <m:t>d</m:t>
                           </m:r>
                           <m:r>
-                            <a:rPr lang="pt-BR" sz="3002" i="1">
+                            <a:rPr lang="pt-BR" sz="3600" i="1">
                               <a:latin typeface="Cambria Math" panose="02040503050406030204" pitchFamily="18" charset="0"/>
                             </a:rPr>
                             <m:t>𝑡</m:t>
@@ -6147,7 +6144,7 @@
                         </m:den>
                       </m:f>
                       <m:r>
-                        <a:rPr lang="pt-BR" sz="3002">
+                        <a:rPr lang="pt-BR" sz="3600">
                           <a:latin typeface="Cambria Math" panose="02040503050406030204" pitchFamily="18" charset="0"/>
                         </a:rPr>
                         <m:t>=</m:t>
@@ -6155,14 +6152,14 @@
                       <m:sSub>
                         <m:sSubPr>
                           <m:ctrlPr>
-                            <a:rPr lang="en-US" sz="3002" i="1">
+                            <a:rPr lang="en-US" sz="3600" i="1">
                               <a:latin typeface="Cambria Math" panose="02040503050406030204" pitchFamily="18" charset="0"/>
                             </a:rPr>
                           </m:ctrlPr>
                         </m:sSubPr>
                         <m:e>
                           <m:r>
-                            <a:rPr lang="pt-BR" sz="3002" i="1">
+                            <a:rPr lang="pt-BR" sz="3600" i="1">
                               <a:latin typeface="Cambria Math" panose="02040503050406030204" pitchFamily="18" charset="0"/>
                             </a:rPr>
                             <m:t>𝐾</m:t>
@@ -6170,7 +6167,7 @@
                         </m:e>
                         <m:sub>
                           <m:r>
-                            <a:rPr lang="pt-BR" sz="3002">
+                            <a:rPr lang="pt-BR" sz="3600">
                               <a:latin typeface="Cambria Math" panose="02040503050406030204" pitchFamily="18" charset="0"/>
                             </a:rPr>
                             <m:t>3</m:t>
@@ -6178,19 +6175,19 @@
                         </m:sub>
                       </m:sSub>
                       <m:r>
-                        <a:rPr lang="pt-BR" sz="3002">
+                        <a:rPr lang="pt-BR" sz="3600">
                           <a:latin typeface="Cambria Math" panose="02040503050406030204" pitchFamily="18" charset="0"/>
                         </a:rPr>
                         <m:t>∙</m:t>
                       </m:r>
                       <m:r>
-                        <a:rPr lang="pt-BR" sz="3002" i="1">
+                        <a:rPr lang="pt-BR" sz="3600" i="1">
                           <a:latin typeface="Cambria Math" panose="02040503050406030204" pitchFamily="18" charset="0"/>
                         </a:rPr>
                         <m:t>𝑆</m:t>
                       </m:r>
                       <m:r>
-                        <a:rPr lang="pt-BR" sz="3002">
+                        <a:rPr lang="pt-BR" sz="3600">
                           <a:latin typeface="Cambria Math" panose="02040503050406030204" pitchFamily="18" charset="0"/>
                         </a:rPr>
                         <m:t>−</m:t>
@@ -6198,14 +6195,14 @@
                       <m:sSub>
                         <m:sSubPr>
                           <m:ctrlPr>
-                            <a:rPr lang="en-US" sz="3002" i="1">
+                            <a:rPr lang="en-US" sz="3600" i="1">
                               <a:latin typeface="Cambria Math" panose="02040503050406030204" pitchFamily="18" charset="0"/>
                             </a:rPr>
                           </m:ctrlPr>
                         </m:sSubPr>
                         <m:e>
                           <m:r>
-                            <a:rPr lang="pt-BR" sz="3002" i="1">
+                            <a:rPr lang="pt-BR" sz="3600" i="1">
                               <a:latin typeface="Cambria Math" panose="02040503050406030204" pitchFamily="18" charset="0"/>
                             </a:rPr>
                             <m:t>𝐾</m:t>
@@ -6213,7 +6210,7 @@
                         </m:e>
                         <m:sub>
                           <m:r>
-                            <a:rPr lang="pt-BR" sz="3002">
+                            <a:rPr lang="pt-BR" sz="3600">
                               <a:latin typeface="Cambria Math" panose="02040503050406030204" pitchFamily="18" charset="0"/>
                             </a:rPr>
                             <m:t>4</m:t>
@@ -6221,19 +6218,19 @@
                         </m:sub>
                       </m:sSub>
                       <m:r>
-                        <a:rPr lang="pt-BR" sz="3002">
+                        <a:rPr lang="pt-BR" sz="3600">
                           <a:latin typeface="Cambria Math" panose="02040503050406030204" pitchFamily="18" charset="0"/>
                         </a:rPr>
                         <m:t>∙</m:t>
                       </m:r>
                       <m:r>
-                        <a:rPr lang="pt-BR" sz="3002" i="1">
+                        <a:rPr lang="pt-BR" sz="3600" i="1">
                           <a:latin typeface="Cambria Math" panose="02040503050406030204" pitchFamily="18" charset="0"/>
                         </a:rPr>
                         <m:t>𝐹</m:t>
                       </m:r>
                       <m:r>
-                        <a:rPr lang="pt-BR" sz="3002">
+                        <a:rPr lang="pt-BR" sz="3600">
                           <a:latin typeface="Cambria Math" panose="02040503050406030204" pitchFamily="18" charset="0"/>
                         </a:rPr>
                         <m:t>−</m:t>
@@ -6241,14 +6238,14 @@
                       <m:sSub>
                         <m:sSubPr>
                           <m:ctrlPr>
-                            <a:rPr lang="en-US" sz="3002" i="1">
+                            <a:rPr lang="en-US" sz="3600" i="1">
                               <a:latin typeface="Cambria Math" panose="02040503050406030204" pitchFamily="18" charset="0"/>
                             </a:rPr>
                           </m:ctrlPr>
                         </m:sSubPr>
                         <m:e>
                           <m:r>
-                            <a:rPr lang="pt-BR" sz="3002" i="1">
+                            <a:rPr lang="pt-BR" sz="3600" i="1">
                               <a:latin typeface="Cambria Math" panose="02040503050406030204" pitchFamily="18" charset="0"/>
                             </a:rPr>
                             <m:t>𝐾</m:t>
@@ -6256,7 +6253,7 @@
                         </m:e>
                         <m:sub>
                           <m:r>
-                            <a:rPr lang="pt-BR" sz="3002" i="1">
+                            <a:rPr lang="pt-BR" sz="3600" i="1">
                               <a:latin typeface="Cambria Math" panose="02040503050406030204" pitchFamily="18" charset="0"/>
                             </a:rPr>
                             <m:t>𝑥</m:t>
@@ -6264,13 +6261,13 @@
                         </m:sub>
                       </m:sSub>
                       <m:r>
-                        <a:rPr lang="pt-BR" sz="3002">
+                        <a:rPr lang="pt-BR" sz="3600">
                           <a:latin typeface="Cambria Math" panose="02040503050406030204" pitchFamily="18" charset="0"/>
                         </a:rPr>
                         <m:t>∙</m:t>
                       </m:r>
                       <m:r>
-                        <a:rPr lang="pt-BR" sz="3002" i="1">
+                        <a:rPr lang="pt-BR" sz="3600" i="1">
                           <a:latin typeface="Cambria Math" panose="02040503050406030204" pitchFamily="18" charset="0"/>
                         </a:rPr>
                         <m:t>𝐹</m:t>
@@ -6278,7 +6275,7 @@
                     </m:oMath>
                   </m:oMathPara>
                 </a14:m>
-                <a:endParaRPr lang="pt-BR" sz="3376" dirty="0"/>
+                <a:endParaRPr lang="pt-BR" sz="3600" dirty="0"/>
               </a:p>
             </p:txBody>
           </p:sp>
@@ -6295,7 +6292,7 @@
             <p:spPr>
               <a:xfrm>
                 <a:off x="12033419" y="15462157"/>
-                <a:ext cx="4968027" cy="970202"/>
+                <a:ext cx="6635672" cy="1145506"/>
               </a:xfrm>
               <a:prstGeom prst="rect">
                 <a:avLst/>
@@ -6343,7 +6340,7 @@
         </p:blipFill>
         <p:spPr>
           <a:xfrm>
-            <a:off x="22080747" y="10300312"/>
+            <a:off x="22294649" y="10348238"/>
             <a:ext cx="6675371" cy="4360863"/>
           </a:xfrm>
           <a:prstGeom prst="rect">
@@ -6373,7 +6370,7 @@
         </p:blipFill>
         <p:spPr>
           <a:xfrm>
-            <a:off x="11959553" y="20758782"/>
+            <a:off x="11613813" y="20349406"/>
             <a:ext cx="7055278" cy="4817642"/>
           </a:xfrm>
           <a:prstGeom prst="rect">
@@ -6402,7 +6399,7 @@
         </p:blipFill>
         <p:spPr>
           <a:xfrm>
-            <a:off x="21760671" y="20878884"/>
+            <a:off x="22001387" y="20755176"/>
             <a:ext cx="9453041" cy="3484656"/>
           </a:xfrm>
           <a:prstGeom prst="rect">
@@ -6434,7 +6431,7 @@
           <a:p>
             <a:r>
               <a:rPr lang="pt-BR" sz="2600" dirty="0"/>
-              <a:t>Primeira iteração, comprovando a acumulação do anabólico no corpo:</a:t>
+              <a:t>Primeira iteração, a partir de uma dose inicial, comprovando a acumulação do anabólico no corpo:</a:t>
             </a:r>
           </a:p>
           <a:p>

</xml_diff>